<commit_message>
Update presentation, commit live coding results
</commit_message>
<xml_diff>
--- a/docs/SpringWorkshopWithAdrian.pptx
+++ b/docs/SpringWorkshopWithAdrian.pptx
@@ -5,7 +5,7 @@
     <p:sldMasterId id="2147483648" r:id="rId1"/>
   </p:sldMasterIdLst>
   <p:notesMasterIdLst>
-    <p:notesMasterId r:id="rId11"/>
+    <p:notesMasterId r:id="rId12"/>
   </p:notesMasterIdLst>
   <p:sldIdLst>
     <p:sldId id="261" r:id="rId2"/>
@@ -13,10 +13,11 @@
     <p:sldId id="263" r:id="rId4"/>
     <p:sldId id="267" r:id="rId5"/>
     <p:sldId id="266" r:id="rId6"/>
-    <p:sldId id="264" r:id="rId7"/>
-    <p:sldId id="265" r:id="rId8"/>
-    <p:sldId id="269" r:id="rId9"/>
-    <p:sldId id="268" r:id="rId10"/>
+    <p:sldId id="270" r:id="rId7"/>
+    <p:sldId id="264" r:id="rId8"/>
+    <p:sldId id="265" r:id="rId9"/>
+    <p:sldId id="269" r:id="rId10"/>
+    <p:sldId id="268" r:id="rId11"/>
   </p:sldIdLst>
   <p:sldSz cx="12192000" cy="6858000"/>
   <p:notesSz cx="6858000" cy="9144000"/>
@@ -205,7 +206,7 @@
           <a:p>
             <a:fld id="{C37C36E4-BAB1-F24F-A7A4-DF4364305354}" type="datetimeFigureOut">
               <a:rPr lang="en-PL" smtClean="0"/>
-              <a:t>11/07/2022</a:t>
+              <a:t>12/07/2022</a:t>
             </a:fld>
             <a:endParaRPr lang="en-PL"/>
           </a:p>
@@ -622,7 +623,7 @@
           <a:p>
             <a:fld id="{5069B1AA-F19E-2B4A-9D86-210F712046F5}" type="datetimeFigureOut">
               <a:rPr lang="en-PL" smtClean="0"/>
-              <a:t>11/07/2022</a:t>
+              <a:t>12/07/2022</a:t>
             </a:fld>
             <a:endParaRPr lang="en-PL"/>
           </a:p>
@@ -822,7 +823,7 @@
           <a:p>
             <a:fld id="{5069B1AA-F19E-2B4A-9D86-210F712046F5}" type="datetimeFigureOut">
               <a:rPr lang="en-PL" smtClean="0"/>
-              <a:t>11/07/2022</a:t>
+              <a:t>12/07/2022</a:t>
             </a:fld>
             <a:endParaRPr lang="en-PL"/>
           </a:p>
@@ -1032,7 +1033,7 @@
           <a:p>
             <a:fld id="{5069B1AA-F19E-2B4A-9D86-210F712046F5}" type="datetimeFigureOut">
               <a:rPr lang="en-PL" smtClean="0"/>
-              <a:t>11/07/2022</a:t>
+              <a:t>12/07/2022</a:t>
             </a:fld>
             <a:endParaRPr lang="en-PL"/>
           </a:p>
@@ -1232,7 +1233,7 @@
           <a:p>
             <a:fld id="{5069B1AA-F19E-2B4A-9D86-210F712046F5}" type="datetimeFigureOut">
               <a:rPr lang="en-PL" smtClean="0"/>
-              <a:t>11/07/2022</a:t>
+              <a:t>12/07/2022</a:t>
             </a:fld>
             <a:endParaRPr lang="en-PL"/>
           </a:p>
@@ -1508,7 +1509,7 @@
           <a:p>
             <a:fld id="{5069B1AA-F19E-2B4A-9D86-210F712046F5}" type="datetimeFigureOut">
               <a:rPr lang="en-PL" smtClean="0"/>
-              <a:t>11/07/2022</a:t>
+              <a:t>12/07/2022</a:t>
             </a:fld>
             <a:endParaRPr lang="en-PL"/>
           </a:p>
@@ -1776,7 +1777,7 @@
           <a:p>
             <a:fld id="{5069B1AA-F19E-2B4A-9D86-210F712046F5}" type="datetimeFigureOut">
               <a:rPr lang="en-PL" smtClean="0"/>
-              <a:t>11/07/2022</a:t>
+              <a:t>12/07/2022</a:t>
             </a:fld>
             <a:endParaRPr lang="en-PL"/>
           </a:p>
@@ -2191,7 +2192,7 @@
           <a:p>
             <a:fld id="{5069B1AA-F19E-2B4A-9D86-210F712046F5}" type="datetimeFigureOut">
               <a:rPr lang="en-PL" smtClean="0"/>
-              <a:t>11/07/2022</a:t>
+              <a:t>12/07/2022</a:t>
             </a:fld>
             <a:endParaRPr lang="en-PL"/>
           </a:p>
@@ -2333,7 +2334,7 @@
           <a:p>
             <a:fld id="{5069B1AA-F19E-2B4A-9D86-210F712046F5}" type="datetimeFigureOut">
               <a:rPr lang="en-PL" smtClean="0"/>
-              <a:t>11/07/2022</a:t>
+              <a:t>12/07/2022</a:t>
             </a:fld>
             <a:endParaRPr lang="en-PL"/>
           </a:p>
@@ -2446,7 +2447,7 @@
           <a:p>
             <a:fld id="{5069B1AA-F19E-2B4A-9D86-210F712046F5}" type="datetimeFigureOut">
               <a:rPr lang="en-PL" smtClean="0"/>
-              <a:t>11/07/2022</a:t>
+              <a:t>12/07/2022</a:t>
             </a:fld>
             <a:endParaRPr lang="en-PL"/>
           </a:p>
@@ -2759,7 +2760,7 @@
           <a:p>
             <a:fld id="{5069B1AA-F19E-2B4A-9D86-210F712046F5}" type="datetimeFigureOut">
               <a:rPr lang="en-PL" smtClean="0"/>
-              <a:t>11/07/2022</a:t>
+              <a:t>12/07/2022</a:t>
             </a:fld>
             <a:endParaRPr lang="en-PL"/>
           </a:p>
@@ -3048,7 +3049,7 @@
           <a:p>
             <a:fld id="{5069B1AA-F19E-2B4A-9D86-210F712046F5}" type="datetimeFigureOut">
               <a:rPr lang="en-PL" smtClean="0"/>
-              <a:t>11/07/2022</a:t>
+              <a:t>12/07/2022</a:t>
             </a:fld>
             <a:endParaRPr lang="en-PL"/>
           </a:p>
@@ -3291,7 +3292,7 @@
           <a:p>
             <a:fld id="{5069B1AA-F19E-2B4A-9D86-210F712046F5}" type="datetimeFigureOut">
               <a:rPr lang="en-PL" smtClean="0"/>
-              <a:t>11/07/2022</a:t>
+              <a:t>12/07/2022</a:t>
             </a:fld>
             <a:endParaRPr lang="en-PL"/>
           </a:p>
@@ -3780,6 +3781,156 @@
 </p:sld>
 </file>
 
+<file path=ppt/slides/slide10.xml><?xml version="1.0" encoding="utf-8"?>
+<p:sld xmlns:a="http://schemas.openxmlformats.org/drawingml/2006/main" xmlns:r="http://schemas.openxmlformats.org/officeDocument/2006/relationships" xmlns:p="http://schemas.openxmlformats.org/presentationml/2006/main">
+  <p:cSld>
+    <p:spTree>
+      <p:nvGrpSpPr>
+        <p:cNvPr id="1" name=""/>
+        <p:cNvGrpSpPr/>
+        <p:nvPr/>
+      </p:nvGrpSpPr>
+      <p:grpSpPr>
+        <a:xfrm>
+          <a:off x="0" y="0"/>
+          <a:ext cx="0" cy="0"/>
+          <a:chOff x="0" y="0"/>
+          <a:chExt cx="0" cy="0"/>
+        </a:xfrm>
+      </p:grpSpPr>
+      <p:sp>
+        <p:nvSpPr>
+          <p:cNvPr id="2" name="Title 1">
+            <a:extLst>
+              <a:ext uri="{FF2B5EF4-FFF2-40B4-BE49-F238E27FC236}">
+                <a16:creationId xmlns:a16="http://schemas.microsoft.com/office/drawing/2014/main" id="{FEFF485B-AFBB-2D4D-8F98-7BD0600D716C}"/>
+              </a:ext>
+            </a:extLst>
+          </p:cNvPr>
+          <p:cNvSpPr>
+            <a:spLocks noGrp="1"/>
+          </p:cNvSpPr>
+          <p:nvPr>
+            <p:ph type="title"/>
+          </p:nvPr>
+        </p:nvSpPr>
+        <p:spPr/>
+        <p:txBody>
+          <a:bodyPr/>
+          <a:lstStyle/>
+          <a:p>
+            <a:r>
+              <a:rPr lang="en-PL" dirty="0"/>
+              <a:t>Bootstrapping Spring Boot App</a:t>
+            </a:r>
+          </a:p>
+        </p:txBody>
+      </p:sp>
+      <p:sp>
+        <p:nvSpPr>
+          <p:cNvPr id="3" name="Content Placeholder 2">
+            <a:extLst>
+              <a:ext uri="{FF2B5EF4-FFF2-40B4-BE49-F238E27FC236}">
+                <a16:creationId xmlns:a16="http://schemas.microsoft.com/office/drawing/2014/main" id="{EC82DF05-400E-8BE2-7C9A-1EF696CAA20F}"/>
+              </a:ext>
+            </a:extLst>
+          </p:cNvPr>
+          <p:cNvSpPr>
+            <a:spLocks noGrp="1"/>
+          </p:cNvSpPr>
+          <p:nvPr>
+            <p:ph idx="1"/>
+          </p:nvPr>
+        </p:nvSpPr>
+        <p:spPr/>
+        <p:txBody>
+          <a:bodyPr>
+            <a:normAutofit/>
+          </a:bodyPr>
+          <a:lstStyle/>
+          <a:p>
+            <a:pPr marL="0" indent="0">
+              <a:buNone/>
+            </a:pPr>
+            <a:r>
+              <a:rPr lang="en-GB" dirty="0"/>
+              <a:t>Spring Boot </a:t>
+            </a:r>
+            <a:r>
+              <a:rPr lang="en-GB" dirty="0" err="1"/>
+              <a:t>Initializr</a:t>
+            </a:r>
+            <a:endParaRPr lang="en-GB" dirty="0"/>
+          </a:p>
+          <a:p>
+            <a:pPr lvl="1"/>
+            <a:r>
+              <a:rPr lang="en-GB" dirty="0"/>
+              <a:t>https://start.spring.io</a:t>
+            </a:r>
+          </a:p>
+          <a:p>
+            <a:pPr lvl="1"/>
+            <a:endParaRPr lang="en-GB" dirty="0"/>
+          </a:p>
+          <a:p>
+            <a:pPr marL="0" indent="0">
+              <a:buNone/>
+            </a:pPr>
+            <a:r>
+              <a:rPr lang="en-GB" dirty="0"/>
+              <a:t>Spring Boot Starters list</a:t>
+            </a:r>
+          </a:p>
+          <a:p>
+            <a:pPr lvl="1"/>
+            <a:r>
+              <a:rPr lang="en-GB" dirty="0"/>
+              <a:t>https://</a:t>
+            </a:r>
+            <a:r>
+              <a:rPr lang="en-GB" dirty="0" err="1"/>
+              <a:t>docs.spring.io</a:t>
+            </a:r>
+            <a:r>
+              <a:rPr lang="en-GB" dirty="0"/>
+              <a:t>/spring-boot/docs/current/reference/</a:t>
+            </a:r>
+            <a:r>
+              <a:rPr lang="en-GB" dirty="0" err="1"/>
+              <a:t>htmlsingle</a:t>
+            </a:r>
+            <a:r>
+              <a:rPr lang="en-GB" dirty="0"/>
+              <a:t>/#</a:t>
+            </a:r>
+            <a:r>
+              <a:rPr lang="en-GB" dirty="0" err="1"/>
+              <a:t>using.build-systems.starters</a:t>
+            </a:r>
+            <a:endParaRPr lang="en-GB" dirty="0"/>
+          </a:p>
+          <a:p>
+            <a:pPr marL="0" indent="0">
+              <a:buNone/>
+            </a:pPr>
+            <a:endParaRPr lang="en-GB" dirty="0"/>
+          </a:p>
+        </p:txBody>
+      </p:sp>
+    </p:spTree>
+    <p:extLst>
+      <p:ext uri="{BB962C8B-B14F-4D97-AF65-F5344CB8AC3E}">
+        <p14:creationId xmlns:p14="http://schemas.microsoft.com/office/powerpoint/2010/main" val="3097249339"/>
+      </p:ext>
+    </p:extLst>
+  </p:cSld>
+  <p:clrMapOvr>
+    <a:masterClrMapping/>
+  </p:clrMapOvr>
+</p:sld>
+</file>
+
 <file path=ppt/slides/slide2.xml><?xml version="1.0" encoding="utf-8"?>
 <p:sld xmlns:a="http://schemas.openxmlformats.org/drawingml/2006/main" xmlns:r="http://schemas.openxmlformats.org/officeDocument/2006/relationships" xmlns:p="http://schemas.openxmlformats.org/presentationml/2006/main">
   <p:cSld>
@@ -3930,6 +4081,17 @@
               <a:buAutoNum type="arabicPeriod"/>
             </a:pPr>
             <a:r>
+              <a:rPr lang="en-PL" sz="1800"/>
+              <a:t>Inversion Of Control &amp; Dependency Injection</a:t>
+            </a:r>
+            <a:endParaRPr lang="en-PL" sz="1800" dirty="0"/>
+          </a:p>
+          <a:p>
+            <a:pPr marL="514350" indent="-514350">
+              <a:buFont typeface="+mj-lt"/>
+              <a:buAutoNum type="arabicPeriod"/>
+            </a:pPr>
+            <a:r>
               <a:rPr lang="en-PL" sz="1800" dirty="0"/>
               <a:t>Spring Container</a:t>
             </a:r>
@@ -4222,8 +4384,16 @@
               <a:buAutoNum type="romanLcPeriod"/>
             </a:pPr>
             <a:r>
+              <a:rPr lang="en-GB" sz="1300" dirty="0">
+                <a:solidFill>
+                  <a:srgbClr val="6C10B9"/>
+                </a:solidFill>
+              </a:rPr>
+              <a:t>Spring Boot</a:t>
+            </a:r>
+            <a:r>
               <a:rPr lang="en-GB" sz="1300" dirty="0"/>
-              <a:t>Spring Boot actuator</a:t>
+              <a:t> actuator</a:t>
             </a:r>
           </a:p>
           <a:p>
@@ -4242,14 +4412,26 @@
               <a:buAutoNum type="romanLcPeriod"/>
             </a:pPr>
             <a:r>
-              <a:rPr lang="en-GB" sz="1300" dirty="0"/>
+              <a:rPr lang="en-GB" sz="1300" dirty="0">
+                <a:solidFill>
+                  <a:srgbClr val="6C10B9"/>
+                </a:solidFill>
+              </a:rPr>
               <a:t>Spring </a:t>
             </a:r>
             <a:r>
-              <a:rPr lang="en-GB" sz="1300" dirty="0" err="1"/>
+              <a:rPr lang="en-GB" sz="1300" dirty="0" err="1">
+                <a:solidFill>
+                  <a:srgbClr val="6C10B9"/>
+                </a:solidFill>
+              </a:rPr>
               <a:t>DevTools</a:t>
             </a:r>
-            <a:endParaRPr lang="en-GB" sz="1300" dirty="0"/>
+            <a:endParaRPr lang="en-GB" sz="1300" dirty="0">
+              <a:solidFill>
+                <a:srgbClr val="6C10B9"/>
+              </a:solidFill>
+            </a:endParaRPr>
           </a:p>
           <a:p>
             <a:pPr marL="857250" lvl="1" indent="-400050">
@@ -4297,7 +4479,11 @@
               <a:buAutoNum type="romanLcPeriod"/>
             </a:pPr>
             <a:r>
-              <a:rPr lang="en-GB" sz="1200" dirty="0"/>
+              <a:rPr lang="en-GB" sz="1200" dirty="0">
+                <a:solidFill>
+                  <a:srgbClr val="6C10B9"/>
+                </a:solidFill>
+              </a:rPr>
               <a:t>Spring Data</a:t>
             </a:r>
           </a:p>
@@ -4625,7 +4811,7 @@
         <p:spPr/>
         <p:txBody>
           <a:bodyPr>
-            <a:normAutofit fontScale="92500" lnSpcReduction="10000"/>
+            <a:normAutofit/>
           </a:bodyPr>
           <a:lstStyle/>
           <a:p>
@@ -4633,11 +4819,11 @@
               <a:buNone/>
             </a:pPr>
             <a:r>
-              <a:rPr lang="en-GB" sz="2400" dirty="0"/>
+              <a:rPr lang="en-GB" sz="2000" dirty="0"/>
               <a:t>The </a:t>
             </a:r>
             <a:r>
-              <a:rPr lang="en-GB" sz="2400" dirty="0">
+              <a:rPr lang="en-GB" sz="2000" dirty="0">
                 <a:solidFill>
                   <a:srgbClr val="6C10B9"/>
                 </a:solidFill>
@@ -4645,7 +4831,7 @@
               <a:t>Spring Framework</a:t>
             </a:r>
             <a:r>
-              <a:rPr lang="en-GB" sz="2400" dirty="0"/>
+              <a:rPr lang="en-GB" sz="2000" dirty="0"/>
               <a:t> provides a comprehensive programming and configuration model for modern Java-based enterprise applications - on any kind of deployment platform.</a:t>
             </a:r>
           </a:p>
@@ -4654,11 +4840,11 @@
               <a:buNone/>
             </a:pPr>
             <a:r>
-              <a:rPr lang="en-GB" sz="2400" dirty="0"/>
+              <a:rPr lang="en-GB" sz="2000" dirty="0"/>
               <a:t>A key element of </a:t>
             </a:r>
             <a:r>
-              <a:rPr lang="en-GB" sz="2400" dirty="0">
+              <a:rPr lang="en-GB" sz="2000" dirty="0">
                 <a:solidFill>
                   <a:srgbClr val="6C10B9"/>
                 </a:solidFill>
@@ -4666,11 +4852,11 @@
               <a:t>Spring</a:t>
             </a:r>
             <a:r>
-              <a:rPr lang="en-GB" sz="2400" dirty="0"/>
+              <a:rPr lang="en-GB" sz="2000" dirty="0"/>
               <a:t> is infrastructural support at the application level: </a:t>
             </a:r>
             <a:r>
-              <a:rPr lang="en-GB" sz="2400" dirty="0">
+              <a:rPr lang="en-GB" sz="2000" dirty="0">
                 <a:solidFill>
                   <a:srgbClr val="6C10B9"/>
                 </a:solidFill>
@@ -4678,7 +4864,7 @@
               <a:t>Spring</a:t>
             </a:r>
             <a:r>
-              <a:rPr lang="en-GB" sz="2400" dirty="0"/>
+              <a:rPr lang="en-GB" sz="2000" dirty="0"/>
               <a:t> focuses on the "plumbing" of enterprise applications so that teams can focus on application-level business logic, without unnecessary ties to specific deployment environments.</a:t>
             </a:r>
           </a:p>
@@ -4686,79 +4872,79 @@
             <a:pPr marL="0" indent="0">
               <a:buNone/>
             </a:pPr>
-            <a:endParaRPr lang="en-GB" sz="2000" dirty="0"/>
+            <a:endParaRPr lang="en-GB" sz="1800" dirty="0"/>
           </a:p>
           <a:p>
             <a:pPr marL="0" indent="0">
               <a:buNone/>
             </a:pPr>
             <a:r>
-              <a:rPr lang="en-GB" sz="2000" dirty="0"/>
+              <a:rPr lang="en-GB" sz="1800" dirty="0"/>
               <a:t>Features:</a:t>
             </a:r>
           </a:p>
           <a:p>
             <a:r>
-              <a:rPr lang="en-GB" sz="1900" dirty="0"/>
+              <a:rPr lang="en-GB" sz="1600" dirty="0"/>
               <a:t>Core technologies: dependency injection, events, resources, i18n, validation, data binding, type conversion, </a:t>
             </a:r>
             <a:r>
-              <a:rPr lang="en-GB" sz="1900" dirty="0" err="1"/>
+              <a:rPr lang="en-GB" sz="1600" dirty="0" err="1"/>
               <a:t>SpEL</a:t>
             </a:r>
             <a:r>
-              <a:rPr lang="en-GB" sz="1900" dirty="0"/>
+              <a:rPr lang="en-GB" sz="1600" dirty="0"/>
               <a:t>, AOP. </a:t>
             </a:r>
           </a:p>
           <a:p>
             <a:r>
-              <a:rPr lang="en-GB" sz="1900" dirty="0"/>
+              <a:rPr lang="en-GB" sz="1600" dirty="0"/>
               <a:t>Testing: mock objects, </a:t>
             </a:r>
             <a:r>
-              <a:rPr lang="en-GB" sz="1900" dirty="0" err="1"/>
+              <a:rPr lang="en-GB" sz="1600" dirty="0" err="1"/>
               <a:t>TestContext</a:t>
             </a:r>
             <a:r>
-              <a:rPr lang="en-GB" sz="1900" dirty="0"/>
+              <a:rPr lang="en-GB" sz="1600" dirty="0"/>
               <a:t> framework, Spring MVC Test, </a:t>
             </a:r>
             <a:r>
-              <a:rPr lang="en-GB" sz="1900" dirty="0" err="1"/>
+              <a:rPr lang="en-GB" sz="1600" dirty="0" err="1"/>
               <a:t>WebTestClient</a:t>
             </a:r>
             <a:r>
-              <a:rPr lang="en-GB" sz="1900" dirty="0"/>
+              <a:rPr lang="en-GB" sz="1600" dirty="0"/>
               <a:t>. </a:t>
             </a:r>
           </a:p>
           <a:p>
             <a:r>
-              <a:rPr lang="en-GB" sz="1900" dirty="0"/>
+              <a:rPr lang="en-GB" sz="1600" dirty="0"/>
               <a:t>Data Access: transactions, DAO support, JDBC, ORM, Marshalling XML. </a:t>
             </a:r>
           </a:p>
           <a:p>
             <a:r>
-              <a:rPr lang="en-GB" sz="1900" dirty="0"/>
+              <a:rPr lang="en-GB" sz="1600" dirty="0"/>
               <a:t>Spring MVC and Spring </a:t>
             </a:r>
             <a:r>
-              <a:rPr lang="en-GB" sz="1900" dirty="0" err="1"/>
+              <a:rPr lang="en-GB" sz="1600" dirty="0" err="1"/>
               <a:t>WebFlux</a:t>
             </a:r>
             <a:r>
-              <a:rPr lang="en-GB" sz="1900" dirty="0"/>
+              <a:rPr lang="en-GB" sz="1600" dirty="0"/>
               <a:t> web frameworks. </a:t>
             </a:r>
           </a:p>
           <a:p>
             <a:r>
-              <a:rPr lang="en-GB" sz="1900" dirty="0"/>
+              <a:rPr lang="en-GB" sz="1600" dirty="0"/>
               <a:t>Integration: remoting, JMS, JCA, JMX, email, tasks, scheduling, cache. </a:t>
             </a:r>
-            <a:endParaRPr lang="en-PL" sz="1900" dirty="0"/>
+            <a:endParaRPr lang="en-PL" sz="1600" dirty="0"/>
           </a:p>
         </p:txBody>
       </p:sp>
@@ -4929,7 +5115,7 @@
         <p:spPr/>
         <p:txBody>
           <a:bodyPr>
-            <a:normAutofit lnSpcReduction="10000"/>
+            <a:normAutofit/>
           </a:bodyPr>
           <a:lstStyle/>
           <a:p>
@@ -4937,8 +5123,28 @@
               <a:buNone/>
             </a:pPr>
             <a:r>
-              <a:rPr lang="en-GB" sz="2200" dirty="0"/>
-              <a:t>Spring Boot makes it easy to create stand-alone, production-grade Spring based Applications that you can "just run". </a:t>
+              <a:rPr lang="en-GB" sz="2000" dirty="0">
+                <a:solidFill>
+                  <a:srgbClr val="6C10B9"/>
+                </a:solidFill>
+              </a:rPr>
+              <a:t>Spring Boot</a:t>
+            </a:r>
+            <a:r>
+              <a:rPr lang="en-GB" sz="2000" dirty="0"/>
+              <a:t> makes it easy to create stand-alone, production-grade </a:t>
+            </a:r>
+            <a:r>
+              <a:rPr lang="en-GB" sz="2000" dirty="0">
+                <a:solidFill>
+                  <a:srgbClr val="6C10B9"/>
+                </a:solidFill>
+              </a:rPr>
+              <a:t>Spring</a:t>
+            </a:r>
+            <a:r>
+              <a:rPr lang="en-GB" sz="2000" dirty="0"/>
+              <a:t> based Applications that you can "just run". </a:t>
             </a:r>
           </a:p>
           <a:p>
@@ -4946,55 +5152,91 @@
               <a:buNone/>
             </a:pPr>
             <a:r>
-              <a:rPr lang="en-GB" sz="2200" dirty="0"/>
-              <a:t>We take an opinionated view of the Spring platform and third-party libraries so you can get started with minimum fuss. Most Spring Boot applications need minimal Spring configuration.</a:t>
+              <a:rPr lang="en-GB" sz="2000" dirty="0"/>
+              <a:t>We take an opinionated view of the </a:t>
+            </a:r>
+            <a:r>
+              <a:rPr lang="en-GB" sz="2000" dirty="0">
+                <a:solidFill>
+                  <a:srgbClr val="6C10B9"/>
+                </a:solidFill>
+              </a:rPr>
+              <a:t>Spring</a:t>
+            </a:r>
+            <a:r>
+              <a:rPr lang="en-GB" sz="2000" dirty="0"/>
+              <a:t> platform and third-party libraries so you can get started with minimum fuss. Most </a:t>
+            </a:r>
+            <a:r>
+              <a:rPr lang="en-GB" sz="2000" dirty="0">
+                <a:solidFill>
+                  <a:srgbClr val="6C10B9"/>
+                </a:solidFill>
+              </a:rPr>
+              <a:t>Spring Boot</a:t>
+            </a:r>
+            <a:r>
+              <a:rPr lang="en-GB" sz="2000" dirty="0"/>
+              <a:t> applications need minimal </a:t>
+            </a:r>
+            <a:r>
+              <a:rPr lang="en-GB" sz="2000" dirty="0">
+                <a:solidFill>
+                  <a:srgbClr val="6C10B9"/>
+                </a:solidFill>
+              </a:rPr>
+              <a:t>Spring</a:t>
+            </a:r>
+            <a:r>
+              <a:rPr lang="en-GB" sz="2000" dirty="0"/>
+              <a:t> configuration.</a:t>
             </a:r>
           </a:p>
           <a:p>
             <a:pPr marL="0" indent="0">
               <a:buNone/>
             </a:pPr>
-            <a:endParaRPr lang="en-GB" sz="2000" dirty="0"/>
+            <a:endParaRPr lang="en-GB" sz="1800" dirty="0"/>
           </a:p>
           <a:p>
             <a:pPr marL="0" indent="0">
               <a:buNone/>
             </a:pPr>
             <a:r>
-              <a:rPr lang="en-PL" sz="2200" dirty="0"/>
+              <a:rPr lang="en-PL" sz="2000" dirty="0"/>
               <a:t>Features:</a:t>
             </a:r>
           </a:p>
           <a:p>
             <a:r>
-              <a:rPr lang="en-GB" sz="1800" dirty="0"/>
+              <a:rPr lang="en-GB" sz="1600" dirty="0"/>
               <a:t>Create stand-alone Spring applications</a:t>
             </a:r>
           </a:p>
           <a:p>
             <a:r>
-              <a:rPr lang="en-GB" sz="1800" dirty="0"/>
+              <a:rPr lang="en-GB" sz="1600" dirty="0"/>
               <a:t>Embed Tomcat, Jetty or Undertow directly (no need to deploy WAR files)</a:t>
             </a:r>
           </a:p>
           <a:p>
             <a:r>
-              <a:rPr lang="en-GB" sz="1800" dirty="0"/>
+              <a:rPr lang="en-GB" sz="1600" dirty="0"/>
               <a:t>Provide opinionated 'starter' dependencies to simplify your build configuration</a:t>
             </a:r>
           </a:p>
           <a:p>
             <a:r>
-              <a:rPr lang="en-GB" sz="1800" dirty="0"/>
+              <a:rPr lang="en-GB" sz="1600" dirty="0"/>
               <a:t>Automatically configure Spring and 3rd party libraries whenever possible</a:t>
             </a:r>
           </a:p>
           <a:p>
             <a:r>
-              <a:rPr lang="en-GB" sz="1800" dirty="0"/>
+              <a:rPr lang="en-GB" sz="1600" dirty="0"/>
               <a:t>Provide production-ready features such as metrics, health checks, and externalized configuration</a:t>
             </a:r>
-            <a:endParaRPr lang="en-PL" sz="1800" dirty="0"/>
+            <a:endParaRPr lang="en-PL" sz="1600" dirty="0"/>
           </a:p>
         </p:txBody>
       </p:sp>
@@ -5117,6 +5359,1346 @@
           <p:cNvPr id="2" name="Title 1">
             <a:extLst>
               <a:ext uri="{FF2B5EF4-FFF2-40B4-BE49-F238E27FC236}">
+                <a16:creationId xmlns:a16="http://schemas.microsoft.com/office/drawing/2014/main" id="{72077416-4E7E-FD91-79E8-2FFA42CEF4A1}"/>
+              </a:ext>
+            </a:extLst>
+          </p:cNvPr>
+          <p:cNvSpPr>
+            <a:spLocks noGrp="1"/>
+          </p:cNvSpPr>
+          <p:nvPr>
+            <p:ph type="title"/>
+          </p:nvPr>
+        </p:nvSpPr>
+        <p:spPr>
+          <a:xfrm>
+            <a:off x="838200" y="365125"/>
+            <a:ext cx="10831286" cy="1325563"/>
+          </a:xfrm>
+        </p:spPr>
+        <p:txBody>
+          <a:bodyPr>
+            <a:normAutofit/>
+          </a:bodyPr>
+          <a:lstStyle/>
+          <a:p>
+            <a:r>
+              <a:rPr lang="en-PL" sz="3800" dirty="0">
+                <a:solidFill>
+                  <a:srgbClr val="6C10B9"/>
+                </a:solidFill>
+                <a:latin typeface="Poppins" pitchFamily="2" charset="77"/>
+                <a:cs typeface="Poppins" pitchFamily="2" charset="77"/>
+              </a:rPr>
+              <a:t>Inversion of Control &amp; Dependency Injection</a:t>
+            </a:r>
+          </a:p>
+        </p:txBody>
+      </p:sp>
+      <p:sp>
+        <p:nvSpPr>
+          <p:cNvPr id="3" name="Content Placeholder 2">
+            <a:extLst>
+              <a:ext uri="{FF2B5EF4-FFF2-40B4-BE49-F238E27FC236}">
+                <a16:creationId xmlns:a16="http://schemas.microsoft.com/office/drawing/2014/main" id="{0CD99540-DD0D-56A4-DD60-10E28747CE18}"/>
+              </a:ext>
+            </a:extLst>
+          </p:cNvPr>
+          <p:cNvSpPr>
+            <a:spLocks noGrp="1"/>
+          </p:cNvSpPr>
+          <p:nvPr>
+            <p:ph idx="1"/>
+          </p:nvPr>
+        </p:nvSpPr>
+        <p:spPr>
+          <a:xfrm>
+            <a:off x="838201" y="1825625"/>
+            <a:ext cx="5099957" cy="4351338"/>
+          </a:xfrm>
+        </p:spPr>
+        <p:txBody>
+          <a:bodyPr>
+            <a:normAutofit/>
+          </a:bodyPr>
+          <a:lstStyle/>
+          <a:p>
+            <a:pPr marL="0" indent="0" algn="just">
+              <a:buNone/>
+            </a:pPr>
+            <a:r>
+              <a:rPr lang="en-GB" sz="1600" b="1" dirty="0">
+                <a:solidFill>
+                  <a:srgbClr val="6C10B9"/>
+                </a:solidFill>
+              </a:rPr>
+              <a:t>IoC</a:t>
+            </a:r>
+          </a:p>
+          <a:p>
+            <a:pPr marL="0" indent="0" algn="just">
+              <a:buNone/>
+            </a:pPr>
+            <a:r>
+              <a:rPr lang="en-GB" sz="1600" dirty="0"/>
+              <a:t>In contrast with traditional programming, in which our custom code makes calls to a library, IoC enables a framework to take control of the flow of a program and make calls to our custom code. To enable this, frameworks use abstractions with additional behaviour built in. If we want to add our own behaviour, we need to extend the classes of the framework or plugin our own classes.</a:t>
+            </a:r>
+          </a:p>
+          <a:p>
+            <a:pPr marL="0" indent="0" algn="just">
+              <a:buNone/>
+            </a:pPr>
+            <a:endParaRPr lang="en-GB" sz="1600" dirty="0"/>
+          </a:p>
+          <a:p>
+            <a:pPr marL="0" indent="0" algn="just">
+              <a:buNone/>
+            </a:pPr>
+            <a:r>
+              <a:rPr lang="en-GB" sz="1600" dirty="0"/>
+              <a:t>The advantages of this architecture are:</a:t>
+            </a:r>
+          </a:p>
+          <a:p>
+            <a:pPr algn="just"/>
+            <a:r>
+              <a:rPr lang="en-GB" sz="1400" dirty="0"/>
+              <a:t>decoupling the execution of a task from its implementation</a:t>
+            </a:r>
+          </a:p>
+          <a:p>
+            <a:pPr algn="just"/>
+            <a:r>
+              <a:rPr lang="en-GB" sz="1400" dirty="0"/>
+              <a:t>making it easier to switch between different implementations </a:t>
+            </a:r>
+          </a:p>
+          <a:p>
+            <a:pPr algn="just"/>
+            <a:r>
+              <a:rPr lang="en-GB" sz="1400" dirty="0"/>
+              <a:t>greater modularity of a program </a:t>
+            </a:r>
+          </a:p>
+          <a:p>
+            <a:pPr algn="just"/>
+            <a:r>
+              <a:rPr lang="en-GB" sz="1400" dirty="0"/>
+              <a:t>greater ease in testing a program by isolating a component or mocking its dependencies, and allowing components to communicate through contracts</a:t>
+            </a:r>
+            <a:endParaRPr lang="en-PL" sz="1400" dirty="0"/>
+          </a:p>
+        </p:txBody>
+      </p:sp>
+      <p:sp>
+        <p:nvSpPr>
+          <p:cNvPr id="4" name="Content Placeholder 2">
+            <a:extLst>
+              <a:ext uri="{FF2B5EF4-FFF2-40B4-BE49-F238E27FC236}">
+                <a16:creationId xmlns:a16="http://schemas.microsoft.com/office/drawing/2014/main" id="{3FE954EC-309C-4663-71CB-BB745F5A877F}"/>
+              </a:ext>
+            </a:extLst>
+          </p:cNvPr>
+          <p:cNvSpPr txBox="1">
+            <a:spLocks/>
+          </p:cNvSpPr>
+          <p:nvPr/>
+        </p:nvSpPr>
+        <p:spPr>
+          <a:xfrm>
+            <a:off x="6542313" y="1822450"/>
+            <a:ext cx="5165271" cy="2009321"/>
+          </a:xfrm>
+          <a:prstGeom prst="rect">
+            <a:avLst/>
+          </a:prstGeom>
+        </p:spPr>
+        <p:txBody>
+          <a:bodyPr vert="horz" lIns="91440" tIns="45720" rIns="91440" bIns="45720" rtlCol="0">
+            <a:normAutofit/>
+          </a:bodyPr>
+          <a:lstStyle>
+            <a:lvl1pPr marL="228600" indent="-228600" algn="l" defTabSz="914400" rtl="0" eaLnBrk="1" latinLnBrk="0" hangingPunct="1">
+              <a:lnSpc>
+                <a:spcPct val="90000"/>
+              </a:lnSpc>
+              <a:spcBef>
+                <a:spcPts val="1000"/>
+              </a:spcBef>
+              <a:buFont typeface="Arial" panose="020B0604020202020204" pitchFamily="34" charset="0"/>
+              <a:buChar char="•"/>
+              <a:defRPr sz="2800" kern="1200">
+                <a:solidFill>
+                  <a:schemeClr val="tx1"/>
+                </a:solidFill>
+                <a:latin typeface="+mn-lt"/>
+                <a:ea typeface="+mn-ea"/>
+                <a:cs typeface="+mn-cs"/>
+              </a:defRPr>
+            </a:lvl1pPr>
+            <a:lvl2pPr marL="685800" indent="-228600" algn="l" defTabSz="914400" rtl="0" eaLnBrk="1" latinLnBrk="0" hangingPunct="1">
+              <a:lnSpc>
+                <a:spcPct val="90000"/>
+              </a:lnSpc>
+              <a:spcBef>
+                <a:spcPts val="500"/>
+              </a:spcBef>
+              <a:buFont typeface="Arial" panose="020B0604020202020204" pitchFamily="34" charset="0"/>
+              <a:buChar char="•"/>
+              <a:defRPr sz="2400" kern="1200">
+                <a:solidFill>
+                  <a:schemeClr val="tx1"/>
+                </a:solidFill>
+                <a:latin typeface="+mn-lt"/>
+                <a:ea typeface="+mn-ea"/>
+                <a:cs typeface="+mn-cs"/>
+              </a:defRPr>
+            </a:lvl2pPr>
+            <a:lvl3pPr marL="1143000" indent="-228600" algn="l" defTabSz="914400" rtl="0" eaLnBrk="1" latinLnBrk="0" hangingPunct="1">
+              <a:lnSpc>
+                <a:spcPct val="90000"/>
+              </a:lnSpc>
+              <a:spcBef>
+                <a:spcPts val="500"/>
+              </a:spcBef>
+              <a:buFont typeface="Arial" panose="020B0604020202020204" pitchFamily="34" charset="0"/>
+              <a:buChar char="•"/>
+              <a:defRPr sz="2000" kern="1200">
+                <a:solidFill>
+                  <a:schemeClr val="tx1"/>
+                </a:solidFill>
+                <a:latin typeface="+mn-lt"/>
+                <a:ea typeface="+mn-ea"/>
+                <a:cs typeface="+mn-cs"/>
+              </a:defRPr>
+            </a:lvl3pPr>
+            <a:lvl4pPr marL="1600200" indent="-228600" algn="l" defTabSz="914400" rtl="0" eaLnBrk="1" latinLnBrk="0" hangingPunct="1">
+              <a:lnSpc>
+                <a:spcPct val="90000"/>
+              </a:lnSpc>
+              <a:spcBef>
+                <a:spcPts val="500"/>
+              </a:spcBef>
+              <a:buFont typeface="Arial" panose="020B0604020202020204" pitchFamily="34" charset="0"/>
+              <a:buChar char="•"/>
+              <a:defRPr sz="1800" kern="1200">
+                <a:solidFill>
+                  <a:schemeClr val="tx1"/>
+                </a:solidFill>
+                <a:latin typeface="+mn-lt"/>
+                <a:ea typeface="+mn-ea"/>
+                <a:cs typeface="+mn-cs"/>
+              </a:defRPr>
+            </a:lvl4pPr>
+            <a:lvl5pPr marL="2057400" indent="-228600" algn="l" defTabSz="914400" rtl="0" eaLnBrk="1" latinLnBrk="0" hangingPunct="1">
+              <a:lnSpc>
+                <a:spcPct val="90000"/>
+              </a:lnSpc>
+              <a:spcBef>
+                <a:spcPts val="500"/>
+              </a:spcBef>
+              <a:buFont typeface="Arial" panose="020B0604020202020204" pitchFamily="34" charset="0"/>
+              <a:buChar char="•"/>
+              <a:defRPr sz="1800" kern="1200">
+                <a:solidFill>
+                  <a:schemeClr val="tx1"/>
+                </a:solidFill>
+                <a:latin typeface="+mn-lt"/>
+                <a:ea typeface="+mn-ea"/>
+                <a:cs typeface="+mn-cs"/>
+              </a:defRPr>
+            </a:lvl5pPr>
+            <a:lvl6pPr marL="2514600" indent="-228600" algn="l" defTabSz="914400" rtl="0" eaLnBrk="1" latinLnBrk="0" hangingPunct="1">
+              <a:lnSpc>
+                <a:spcPct val="90000"/>
+              </a:lnSpc>
+              <a:spcBef>
+                <a:spcPts val="500"/>
+              </a:spcBef>
+              <a:buFont typeface="Arial" panose="020B0604020202020204" pitchFamily="34" charset="0"/>
+              <a:buChar char="•"/>
+              <a:defRPr sz="1800" kern="1200">
+                <a:solidFill>
+                  <a:schemeClr val="tx1"/>
+                </a:solidFill>
+                <a:latin typeface="+mn-lt"/>
+                <a:ea typeface="+mn-ea"/>
+                <a:cs typeface="+mn-cs"/>
+              </a:defRPr>
+            </a:lvl6pPr>
+            <a:lvl7pPr marL="2971800" indent="-228600" algn="l" defTabSz="914400" rtl="0" eaLnBrk="1" latinLnBrk="0" hangingPunct="1">
+              <a:lnSpc>
+                <a:spcPct val="90000"/>
+              </a:lnSpc>
+              <a:spcBef>
+                <a:spcPts val="500"/>
+              </a:spcBef>
+              <a:buFont typeface="Arial" panose="020B0604020202020204" pitchFamily="34" charset="0"/>
+              <a:buChar char="•"/>
+              <a:defRPr sz="1800" kern="1200">
+                <a:solidFill>
+                  <a:schemeClr val="tx1"/>
+                </a:solidFill>
+                <a:latin typeface="+mn-lt"/>
+                <a:ea typeface="+mn-ea"/>
+                <a:cs typeface="+mn-cs"/>
+              </a:defRPr>
+            </a:lvl7pPr>
+            <a:lvl8pPr marL="3429000" indent="-228600" algn="l" defTabSz="914400" rtl="0" eaLnBrk="1" latinLnBrk="0" hangingPunct="1">
+              <a:lnSpc>
+                <a:spcPct val="90000"/>
+              </a:lnSpc>
+              <a:spcBef>
+                <a:spcPts val="500"/>
+              </a:spcBef>
+              <a:buFont typeface="Arial" panose="020B0604020202020204" pitchFamily="34" charset="0"/>
+              <a:buChar char="•"/>
+              <a:defRPr sz="1800" kern="1200">
+                <a:solidFill>
+                  <a:schemeClr val="tx1"/>
+                </a:solidFill>
+                <a:latin typeface="+mn-lt"/>
+                <a:ea typeface="+mn-ea"/>
+                <a:cs typeface="+mn-cs"/>
+              </a:defRPr>
+            </a:lvl8pPr>
+            <a:lvl9pPr marL="3886200" indent="-228600" algn="l" defTabSz="914400" rtl="0" eaLnBrk="1" latinLnBrk="0" hangingPunct="1">
+              <a:lnSpc>
+                <a:spcPct val="90000"/>
+              </a:lnSpc>
+              <a:spcBef>
+                <a:spcPts val="500"/>
+              </a:spcBef>
+              <a:buFont typeface="Arial" panose="020B0604020202020204" pitchFamily="34" charset="0"/>
+              <a:buChar char="•"/>
+              <a:defRPr sz="1800" kern="1200">
+                <a:solidFill>
+                  <a:schemeClr val="tx1"/>
+                </a:solidFill>
+                <a:latin typeface="+mn-lt"/>
+                <a:ea typeface="+mn-ea"/>
+                <a:cs typeface="+mn-cs"/>
+              </a:defRPr>
+            </a:lvl9pPr>
+          </a:lstStyle>
+          <a:p>
+            <a:pPr marL="0" indent="0" algn="just">
+              <a:buFont typeface="Arial" panose="020B0604020202020204" pitchFamily="34" charset="0"/>
+              <a:buNone/>
+            </a:pPr>
+            <a:r>
+              <a:rPr lang="en-GB" sz="1600" dirty="0">
+                <a:solidFill>
+                  <a:srgbClr val="6C10B9"/>
+                </a:solidFill>
+              </a:rPr>
+              <a:t>DI</a:t>
+            </a:r>
+          </a:p>
+          <a:p>
+            <a:pPr marL="0" indent="0" algn="just">
+              <a:buNone/>
+            </a:pPr>
+            <a:r>
+              <a:rPr lang="en-GB" sz="1600" dirty="0"/>
+              <a:t>Dependency injection is a pattern we can use to implement IoC, where the control being inverted is setting an object's dependencies. </a:t>
+            </a:r>
+          </a:p>
+          <a:p>
+            <a:pPr marL="0" indent="0" algn="just">
+              <a:buNone/>
+            </a:pPr>
+            <a:r>
+              <a:rPr lang="en-GB" sz="1600" dirty="0"/>
+              <a:t>Connecting objects with other objects, or “injecting” objects into other objects, is done by an assembler rather than by the objects themselves.</a:t>
+            </a:r>
+          </a:p>
+        </p:txBody>
+      </p:sp>
+      <p:sp>
+        <p:nvSpPr>
+          <p:cNvPr id="5" name="Rectangle 4">
+            <a:extLst>
+              <a:ext uri="{FF2B5EF4-FFF2-40B4-BE49-F238E27FC236}">
+                <a16:creationId xmlns:a16="http://schemas.microsoft.com/office/drawing/2014/main" id="{9C212D23-FED1-DAB7-4C04-A0B19D9803E0}"/>
+              </a:ext>
+            </a:extLst>
+          </p:cNvPr>
+          <p:cNvSpPr/>
+          <p:nvPr/>
+        </p:nvSpPr>
+        <p:spPr>
+          <a:xfrm>
+            <a:off x="6542314" y="4753993"/>
+            <a:ext cx="2168978" cy="1422970"/>
+          </a:xfrm>
+          <a:prstGeom prst="rect">
+            <a:avLst/>
+          </a:prstGeom>
+        </p:spPr>
+        <p:txBody>
+          <a:bodyPr wrap="square">
+            <a:spAutoFit/>
+          </a:bodyPr>
+          <a:lstStyle/>
+          <a:p>
+            <a:r>
+              <a:rPr lang="en-GB" sz="1200" dirty="0">
+                <a:solidFill>
+                  <a:srgbClr val="CC7832"/>
+                </a:solidFill>
+                <a:latin typeface=""/>
+              </a:rPr>
+              <a:t>public class </a:t>
+            </a:r>
+            <a:r>
+              <a:rPr lang="en-GB" sz="1200" dirty="0">
+                <a:latin typeface=""/>
+              </a:rPr>
+              <a:t>Store </a:t>
+            </a:r>
+            <a:r>
+              <a:rPr lang="en-GB" sz="1200" dirty="0">
+                <a:solidFill>
+                  <a:srgbClr val="E8BA36"/>
+                </a:solidFill>
+                <a:latin typeface=""/>
+              </a:rPr>
+              <a:t>{</a:t>
+            </a:r>
+            <a:br>
+              <a:rPr lang="en-GB" sz="1200" dirty="0">
+                <a:solidFill>
+                  <a:srgbClr val="E8BA36"/>
+                </a:solidFill>
+                <a:latin typeface=""/>
+              </a:rPr>
+            </a:br>
+            <a:r>
+              <a:rPr lang="en-GB" sz="1200" dirty="0">
+                <a:solidFill>
+                  <a:srgbClr val="E8BA36"/>
+                </a:solidFill>
+                <a:latin typeface=""/>
+              </a:rPr>
+              <a:t>    </a:t>
+            </a:r>
+            <a:r>
+              <a:rPr lang="en-GB" sz="1200" dirty="0">
+                <a:solidFill>
+                  <a:srgbClr val="CC7832"/>
+                </a:solidFill>
+                <a:latin typeface=""/>
+              </a:rPr>
+              <a:t>private </a:t>
+            </a:r>
+            <a:r>
+              <a:rPr lang="en-GB" sz="1200" dirty="0">
+                <a:latin typeface=""/>
+              </a:rPr>
+              <a:t>Item </a:t>
+            </a:r>
+            <a:r>
+              <a:rPr lang="en-GB" sz="1200" dirty="0">
+                <a:solidFill>
+                  <a:srgbClr val="9876AA"/>
+                </a:solidFill>
+                <a:latin typeface=""/>
+              </a:rPr>
+              <a:t>item</a:t>
+            </a:r>
+            <a:r>
+              <a:rPr lang="en-GB" sz="1200" dirty="0">
+                <a:solidFill>
+                  <a:srgbClr val="CC7832"/>
+                </a:solidFill>
+                <a:latin typeface=""/>
+              </a:rPr>
+              <a:t>;</a:t>
+            </a:r>
+            <a:br>
+              <a:rPr lang="en-GB" sz="1200" dirty="0">
+                <a:solidFill>
+                  <a:srgbClr val="CC7832"/>
+                </a:solidFill>
+                <a:latin typeface=""/>
+              </a:rPr>
+            </a:br>
+            <a:br>
+              <a:rPr lang="en-GB" sz="1200" dirty="0">
+                <a:solidFill>
+                  <a:srgbClr val="CC7832"/>
+                </a:solidFill>
+                <a:latin typeface=""/>
+              </a:rPr>
+            </a:br>
+            <a:r>
+              <a:rPr lang="en-GB" sz="1200" dirty="0">
+                <a:solidFill>
+                  <a:srgbClr val="CC7832"/>
+                </a:solidFill>
+                <a:latin typeface=""/>
+              </a:rPr>
+              <a:t>    public </a:t>
+            </a:r>
+            <a:r>
+              <a:rPr lang="en-GB" sz="1200" dirty="0">
+                <a:solidFill>
+                  <a:srgbClr val="FFC66D"/>
+                </a:solidFill>
+                <a:latin typeface=""/>
+              </a:rPr>
+              <a:t>Store</a:t>
+            </a:r>
+            <a:r>
+              <a:rPr lang="en-GB" sz="1200" dirty="0">
+                <a:solidFill>
+                  <a:srgbClr val="E8BA36"/>
+                </a:solidFill>
+                <a:latin typeface=""/>
+              </a:rPr>
+              <a:t>() </a:t>
+            </a:r>
+            <a:r>
+              <a:rPr lang="en-GB" sz="1200" dirty="0">
+                <a:solidFill>
+                  <a:srgbClr val="54A857"/>
+                </a:solidFill>
+                <a:latin typeface=""/>
+              </a:rPr>
+              <a:t>{</a:t>
+            </a:r>
+            <a:br>
+              <a:rPr lang="en-GB" sz="1200" dirty="0">
+                <a:solidFill>
+                  <a:srgbClr val="54A857"/>
+                </a:solidFill>
+                <a:latin typeface=""/>
+              </a:rPr>
+            </a:br>
+            <a:r>
+              <a:rPr lang="en-GB" sz="1200" dirty="0">
+                <a:solidFill>
+                  <a:srgbClr val="54A857"/>
+                </a:solidFill>
+                <a:latin typeface=""/>
+              </a:rPr>
+              <a:t>        </a:t>
+            </a:r>
+            <a:r>
+              <a:rPr lang="en-GB" sz="1200" dirty="0">
+                <a:solidFill>
+                  <a:srgbClr val="9876AA"/>
+                </a:solidFill>
+                <a:latin typeface=""/>
+              </a:rPr>
+              <a:t>item </a:t>
+            </a:r>
+            <a:r>
+              <a:rPr lang="en-GB" sz="1200" dirty="0">
+                <a:latin typeface=""/>
+              </a:rPr>
+              <a:t>= </a:t>
+            </a:r>
+            <a:r>
+              <a:rPr lang="en-GB" sz="1200" dirty="0">
+                <a:solidFill>
+                  <a:srgbClr val="CC7832"/>
+                </a:solidFill>
+                <a:latin typeface=""/>
+              </a:rPr>
+              <a:t>new </a:t>
+            </a:r>
+            <a:r>
+              <a:rPr lang="en-GB" sz="1200" dirty="0">
+                <a:latin typeface=""/>
+              </a:rPr>
+              <a:t>ItemImpl1</a:t>
+            </a:r>
+            <a:r>
+              <a:rPr lang="en-GB" sz="1200" dirty="0">
+                <a:solidFill>
+                  <a:srgbClr val="E8BA36"/>
+                </a:solidFill>
+                <a:latin typeface=""/>
+              </a:rPr>
+              <a:t>()</a:t>
+            </a:r>
+            <a:r>
+              <a:rPr lang="en-GB" sz="1200" dirty="0">
+                <a:solidFill>
+                  <a:srgbClr val="CC7832"/>
+                </a:solidFill>
+                <a:latin typeface=""/>
+              </a:rPr>
+              <a:t>;</a:t>
+            </a:r>
+            <a:br>
+              <a:rPr lang="en-GB" sz="1200" dirty="0">
+                <a:solidFill>
+                  <a:srgbClr val="CC7832"/>
+                </a:solidFill>
+                <a:latin typeface=""/>
+              </a:rPr>
+            </a:br>
+            <a:r>
+              <a:rPr lang="en-GB" sz="1200" dirty="0">
+                <a:solidFill>
+                  <a:srgbClr val="CC7832"/>
+                </a:solidFill>
+                <a:latin typeface=""/>
+              </a:rPr>
+              <a:t>    </a:t>
+            </a:r>
+            <a:r>
+              <a:rPr lang="en-GB" sz="1200" dirty="0">
+                <a:solidFill>
+                  <a:srgbClr val="54A857"/>
+                </a:solidFill>
+                <a:latin typeface=""/>
+              </a:rPr>
+              <a:t>}</a:t>
+            </a:r>
+            <a:br>
+              <a:rPr lang="en-GB" sz="1200" dirty="0">
+                <a:solidFill>
+                  <a:srgbClr val="54A857"/>
+                </a:solidFill>
+                <a:latin typeface=""/>
+              </a:rPr>
+            </a:br>
+            <a:r>
+              <a:rPr lang="en-GB" sz="1200" dirty="0">
+                <a:solidFill>
+                  <a:srgbClr val="E8BA36"/>
+                </a:solidFill>
+                <a:latin typeface=""/>
+              </a:rPr>
+              <a:t>}</a:t>
+            </a:r>
+            <a:endParaRPr lang="en-PL" sz="1200" dirty="0">
+              <a:latin typeface=""/>
+            </a:endParaRPr>
+          </a:p>
+        </p:txBody>
+      </p:sp>
+      <p:sp>
+        <p:nvSpPr>
+          <p:cNvPr id="6" name="Rectangle 5">
+            <a:extLst>
+              <a:ext uri="{FF2B5EF4-FFF2-40B4-BE49-F238E27FC236}">
+                <a16:creationId xmlns:a16="http://schemas.microsoft.com/office/drawing/2014/main" id="{E013E123-48FA-B1DD-9990-3364CAC5CDE8}"/>
+              </a:ext>
+            </a:extLst>
+          </p:cNvPr>
+          <p:cNvSpPr/>
+          <p:nvPr/>
+        </p:nvSpPr>
+        <p:spPr>
+          <a:xfrm>
+            <a:off x="9315448" y="4753993"/>
+            <a:ext cx="2354037" cy="1384995"/>
+          </a:xfrm>
+          <a:prstGeom prst="rect">
+            <a:avLst/>
+          </a:prstGeom>
+        </p:spPr>
+        <p:txBody>
+          <a:bodyPr wrap="square">
+            <a:spAutoFit/>
+          </a:bodyPr>
+          <a:lstStyle/>
+          <a:p>
+            <a:r>
+              <a:rPr lang="en-GB" sz="1200" dirty="0">
+                <a:solidFill>
+                  <a:srgbClr val="CC7832"/>
+                </a:solidFill>
+                <a:latin typeface=""/>
+              </a:rPr>
+              <a:t>public class </a:t>
+            </a:r>
+            <a:r>
+              <a:rPr lang="en-GB" sz="1200" dirty="0">
+                <a:latin typeface=""/>
+              </a:rPr>
+              <a:t>Store </a:t>
+            </a:r>
+            <a:r>
+              <a:rPr lang="en-GB" sz="1200" dirty="0">
+                <a:solidFill>
+                  <a:srgbClr val="E8BA36"/>
+                </a:solidFill>
+                <a:latin typeface=""/>
+              </a:rPr>
+              <a:t>{</a:t>
+            </a:r>
+            <a:br>
+              <a:rPr lang="en-GB" sz="1200" dirty="0">
+                <a:solidFill>
+                  <a:srgbClr val="E8BA36"/>
+                </a:solidFill>
+                <a:latin typeface=""/>
+              </a:rPr>
+            </a:br>
+            <a:r>
+              <a:rPr lang="en-GB" sz="1200" dirty="0">
+                <a:solidFill>
+                  <a:srgbClr val="E8BA36"/>
+                </a:solidFill>
+                <a:latin typeface=""/>
+              </a:rPr>
+              <a:t>    </a:t>
+            </a:r>
+            <a:r>
+              <a:rPr lang="en-GB" sz="1200" dirty="0">
+                <a:solidFill>
+                  <a:srgbClr val="CC7832"/>
+                </a:solidFill>
+                <a:latin typeface=""/>
+              </a:rPr>
+              <a:t>private </a:t>
+            </a:r>
+            <a:r>
+              <a:rPr lang="en-GB" sz="1200" dirty="0">
+                <a:latin typeface=""/>
+              </a:rPr>
+              <a:t>Item </a:t>
+            </a:r>
+            <a:r>
+              <a:rPr lang="en-GB" sz="1200" dirty="0">
+                <a:solidFill>
+                  <a:srgbClr val="9876AA"/>
+                </a:solidFill>
+                <a:latin typeface=""/>
+              </a:rPr>
+              <a:t>item</a:t>
+            </a:r>
+            <a:r>
+              <a:rPr lang="en-GB" sz="1200" dirty="0">
+                <a:solidFill>
+                  <a:srgbClr val="CC7832"/>
+                </a:solidFill>
+                <a:latin typeface=""/>
+              </a:rPr>
+              <a:t>;</a:t>
+            </a:r>
+          </a:p>
+          <a:p>
+            <a:br>
+              <a:rPr lang="en-GB" sz="1200" dirty="0">
+                <a:solidFill>
+                  <a:srgbClr val="CC7832"/>
+                </a:solidFill>
+                <a:latin typeface=""/>
+              </a:rPr>
+            </a:br>
+            <a:r>
+              <a:rPr lang="en-GB" sz="1200" dirty="0">
+                <a:solidFill>
+                  <a:srgbClr val="CC7832"/>
+                </a:solidFill>
+                <a:latin typeface=""/>
+              </a:rPr>
+              <a:t>    public </a:t>
+            </a:r>
+            <a:r>
+              <a:rPr lang="en-GB" sz="1200" dirty="0">
+                <a:solidFill>
+                  <a:srgbClr val="FFC66D"/>
+                </a:solidFill>
+                <a:latin typeface=""/>
+              </a:rPr>
+              <a:t>Store</a:t>
+            </a:r>
+            <a:r>
+              <a:rPr lang="en-GB" sz="1200" dirty="0">
+                <a:solidFill>
+                  <a:srgbClr val="E8BA36"/>
+                </a:solidFill>
+                <a:latin typeface=""/>
+              </a:rPr>
+              <a:t>(</a:t>
+            </a:r>
+            <a:r>
+              <a:rPr lang="en-GB" sz="1200" dirty="0">
+                <a:latin typeface=""/>
+              </a:rPr>
+              <a:t>Item item</a:t>
+            </a:r>
+            <a:r>
+              <a:rPr lang="en-GB" sz="1200" dirty="0">
+                <a:solidFill>
+                  <a:srgbClr val="E8BA36"/>
+                </a:solidFill>
+                <a:latin typeface=""/>
+              </a:rPr>
+              <a:t>) </a:t>
+            </a:r>
+            <a:r>
+              <a:rPr lang="en-GB" sz="1200" dirty="0">
+                <a:solidFill>
+                  <a:srgbClr val="54A857"/>
+                </a:solidFill>
+                <a:latin typeface=""/>
+              </a:rPr>
+              <a:t>{</a:t>
+            </a:r>
+            <a:br>
+              <a:rPr lang="en-GB" sz="1200" dirty="0">
+                <a:solidFill>
+                  <a:srgbClr val="54A857"/>
+                </a:solidFill>
+                <a:latin typeface=""/>
+              </a:rPr>
+            </a:br>
+            <a:r>
+              <a:rPr lang="en-GB" sz="1200" dirty="0">
+                <a:solidFill>
+                  <a:srgbClr val="54A857"/>
+                </a:solidFill>
+                <a:latin typeface=""/>
+              </a:rPr>
+              <a:t>        </a:t>
+            </a:r>
+            <a:r>
+              <a:rPr lang="en-GB" sz="1200" dirty="0" err="1">
+                <a:solidFill>
+                  <a:srgbClr val="CC7832"/>
+                </a:solidFill>
+                <a:latin typeface=""/>
+              </a:rPr>
+              <a:t>this</a:t>
+            </a:r>
+            <a:r>
+              <a:rPr lang="en-GB" sz="1200" dirty="0" err="1">
+                <a:latin typeface=""/>
+              </a:rPr>
+              <a:t>.</a:t>
+            </a:r>
+            <a:r>
+              <a:rPr lang="en-GB" sz="1200" dirty="0" err="1">
+                <a:solidFill>
+                  <a:srgbClr val="9876AA"/>
+                </a:solidFill>
+                <a:latin typeface=""/>
+              </a:rPr>
+              <a:t>item</a:t>
+            </a:r>
+            <a:r>
+              <a:rPr lang="en-GB" sz="1200" dirty="0">
+                <a:solidFill>
+                  <a:srgbClr val="9876AA"/>
+                </a:solidFill>
+                <a:latin typeface=""/>
+              </a:rPr>
+              <a:t> </a:t>
+            </a:r>
+            <a:r>
+              <a:rPr lang="en-GB" sz="1200" dirty="0">
+                <a:latin typeface=""/>
+              </a:rPr>
+              <a:t>= item</a:t>
+            </a:r>
+            <a:r>
+              <a:rPr lang="en-GB" sz="1200" dirty="0">
+                <a:solidFill>
+                  <a:srgbClr val="CC7832"/>
+                </a:solidFill>
+                <a:latin typeface=""/>
+              </a:rPr>
+              <a:t>;</a:t>
+            </a:r>
+            <a:br>
+              <a:rPr lang="en-GB" sz="1200" dirty="0">
+                <a:solidFill>
+                  <a:srgbClr val="CC7832"/>
+                </a:solidFill>
+                <a:latin typeface=""/>
+              </a:rPr>
+            </a:br>
+            <a:r>
+              <a:rPr lang="en-GB" sz="1200" dirty="0">
+                <a:solidFill>
+                  <a:srgbClr val="CC7832"/>
+                </a:solidFill>
+                <a:latin typeface=""/>
+              </a:rPr>
+              <a:t>    </a:t>
+            </a:r>
+            <a:r>
+              <a:rPr lang="en-GB" sz="1200" dirty="0">
+                <a:solidFill>
+                  <a:srgbClr val="54A857"/>
+                </a:solidFill>
+                <a:latin typeface=""/>
+              </a:rPr>
+              <a:t>}</a:t>
+            </a:r>
+            <a:br>
+              <a:rPr lang="en-GB" sz="1200" dirty="0">
+                <a:solidFill>
+                  <a:srgbClr val="54A857"/>
+                </a:solidFill>
+                <a:latin typeface=""/>
+              </a:rPr>
+            </a:br>
+            <a:r>
+              <a:rPr lang="en-GB" sz="1200" dirty="0">
+                <a:solidFill>
+                  <a:srgbClr val="E8BA36"/>
+                </a:solidFill>
+                <a:latin typeface=""/>
+              </a:rPr>
+              <a:t>}</a:t>
+            </a:r>
+            <a:endParaRPr lang="en-PL" sz="1200" dirty="0">
+              <a:latin typeface=""/>
+            </a:endParaRPr>
+          </a:p>
+        </p:txBody>
+      </p:sp>
+      <p:sp>
+        <p:nvSpPr>
+          <p:cNvPr id="7" name="Content Placeholder 2">
+            <a:extLst>
+              <a:ext uri="{FF2B5EF4-FFF2-40B4-BE49-F238E27FC236}">
+                <a16:creationId xmlns:a16="http://schemas.microsoft.com/office/drawing/2014/main" id="{7218D90B-4D2C-4AD0-7A4C-6818B5811F80}"/>
+              </a:ext>
+            </a:extLst>
+          </p:cNvPr>
+          <p:cNvSpPr txBox="1">
+            <a:spLocks/>
+          </p:cNvSpPr>
+          <p:nvPr/>
+        </p:nvSpPr>
+        <p:spPr>
+          <a:xfrm>
+            <a:off x="6623956" y="4326274"/>
+            <a:ext cx="1736273" cy="427719"/>
+          </a:xfrm>
+          <a:prstGeom prst="rect">
+            <a:avLst/>
+          </a:prstGeom>
+        </p:spPr>
+        <p:txBody>
+          <a:bodyPr vert="horz" lIns="91440" tIns="45720" rIns="91440" bIns="45720" rtlCol="0">
+            <a:normAutofit/>
+          </a:bodyPr>
+          <a:lstStyle>
+            <a:lvl1pPr marL="228600" indent="-228600" algn="l" defTabSz="914400" rtl="0" eaLnBrk="1" latinLnBrk="0" hangingPunct="1">
+              <a:lnSpc>
+                <a:spcPct val="90000"/>
+              </a:lnSpc>
+              <a:spcBef>
+                <a:spcPts val="1000"/>
+              </a:spcBef>
+              <a:buFont typeface="Arial" panose="020B0604020202020204" pitchFamily="34" charset="0"/>
+              <a:buChar char="•"/>
+              <a:defRPr sz="2800" kern="1200">
+                <a:solidFill>
+                  <a:schemeClr val="tx1"/>
+                </a:solidFill>
+                <a:latin typeface="+mn-lt"/>
+                <a:ea typeface="+mn-ea"/>
+                <a:cs typeface="+mn-cs"/>
+              </a:defRPr>
+            </a:lvl1pPr>
+            <a:lvl2pPr marL="685800" indent="-228600" algn="l" defTabSz="914400" rtl="0" eaLnBrk="1" latinLnBrk="0" hangingPunct="1">
+              <a:lnSpc>
+                <a:spcPct val="90000"/>
+              </a:lnSpc>
+              <a:spcBef>
+                <a:spcPts val="500"/>
+              </a:spcBef>
+              <a:buFont typeface="Arial" panose="020B0604020202020204" pitchFamily="34" charset="0"/>
+              <a:buChar char="•"/>
+              <a:defRPr sz="2400" kern="1200">
+                <a:solidFill>
+                  <a:schemeClr val="tx1"/>
+                </a:solidFill>
+                <a:latin typeface="+mn-lt"/>
+                <a:ea typeface="+mn-ea"/>
+                <a:cs typeface="+mn-cs"/>
+              </a:defRPr>
+            </a:lvl2pPr>
+            <a:lvl3pPr marL="1143000" indent="-228600" algn="l" defTabSz="914400" rtl="0" eaLnBrk="1" latinLnBrk="0" hangingPunct="1">
+              <a:lnSpc>
+                <a:spcPct val="90000"/>
+              </a:lnSpc>
+              <a:spcBef>
+                <a:spcPts val="500"/>
+              </a:spcBef>
+              <a:buFont typeface="Arial" panose="020B0604020202020204" pitchFamily="34" charset="0"/>
+              <a:buChar char="•"/>
+              <a:defRPr sz="2000" kern="1200">
+                <a:solidFill>
+                  <a:schemeClr val="tx1"/>
+                </a:solidFill>
+                <a:latin typeface="+mn-lt"/>
+                <a:ea typeface="+mn-ea"/>
+                <a:cs typeface="+mn-cs"/>
+              </a:defRPr>
+            </a:lvl3pPr>
+            <a:lvl4pPr marL="1600200" indent="-228600" algn="l" defTabSz="914400" rtl="0" eaLnBrk="1" latinLnBrk="0" hangingPunct="1">
+              <a:lnSpc>
+                <a:spcPct val="90000"/>
+              </a:lnSpc>
+              <a:spcBef>
+                <a:spcPts val="500"/>
+              </a:spcBef>
+              <a:buFont typeface="Arial" panose="020B0604020202020204" pitchFamily="34" charset="0"/>
+              <a:buChar char="•"/>
+              <a:defRPr sz="1800" kern="1200">
+                <a:solidFill>
+                  <a:schemeClr val="tx1"/>
+                </a:solidFill>
+                <a:latin typeface="+mn-lt"/>
+                <a:ea typeface="+mn-ea"/>
+                <a:cs typeface="+mn-cs"/>
+              </a:defRPr>
+            </a:lvl4pPr>
+            <a:lvl5pPr marL="2057400" indent="-228600" algn="l" defTabSz="914400" rtl="0" eaLnBrk="1" latinLnBrk="0" hangingPunct="1">
+              <a:lnSpc>
+                <a:spcPct val="90000"/>
+              </a:lnSpc>
+              <a:spcBef>
+                <a:spcPts val="500"/>
+              </a:spcBef>
+              <a:buFont typeface="Arial" panose="020B0604020202020204" pitchFamily="34" charset="0"/>
+              <a:buChar char="•"/>
+              <a:defRPr sz="1800" kern="1200">
+                <a:solidFill>
+                  <a:schemeClr val="tx1"/>
+                </a:solidFill>
+                <a:latin typeface="+mn-lt"/>
+                <a:ea typeface="+mn-ea"/>
+                <a:cs typeface="+mn-cs"/>
+              </a:defRPr>
+            </a:lvl5pPr>
+            <a:lvl6pPr marL="2514600" indent="-228600" algn="l" defTabSz="914400" rtl="0" eaLnBrk="1" latinLnBrk="0" hangingPunct="1">
+              <a:lnSpc>
+                <a:spcPct val="90000"/>
+              </a:lnSpc>
+              <a:spcBef>
+                <a:spcPts val="500"/>
+              </a:spcBef>
+              <a:buFont typeface="Arial" panose="020B0604020202020204" pitchFamily="34" charset="0"/>
+              <a:buChar char="•"/>
+              <a:defRPr sz="1800" kern="1200">
+                <a:solidFill>
+                  <a:schemeClr val="tx1"/>
+                </a:solidFill>
+                <a:latin typeface="+mn-lt"/>
+                <a:ea typeface="+mn-ea"/>
+                <a:cs typeface="+mn-cs"/>
+              </a:defRPr>
+            </a:lvl6pPr>
+            <a:lvl7pPr marL="2971800" indent="-228600" algn="l" defTabSz="914400" rtl="0" eaLnBrk="1" latinLnBrk="0" hangingPunct="1">
+              <a:lnSpc>
+                <a:spcPct val="90000"/>
+              </a:lnSpc>
+              <a:spcBef>
+                <a:spcPts val="500"/>
+              </a:spcBef>
+              <a:buFont typeface="Arial" panose="020B0604020202020204" pitchFamily="34" charset="0"/>
+              <a:buChar char="•"/>
+              <a:defRPr sz="1800" kern="1200">
+                <a:solidFill>
+                  <a:schemeClr val="tx1"/>
+                </a:solidFill>
+                <a:latin typeface="+mn-lt"/>
+                <a:ea typeface="+mn-ea"/>
+                <a:cs typeface="+mn-cs"/>
+              </a:defRPr>
+            </a:lvl7pPr>
+            <a:lvl8pPr marL="3429000" indent="-228600" algn="l" defTabSz="914400" rtl="0" eaLnBrk="1" latinLnBrk="0" hangingPunct="1">
+              <a:lnSpc>
+                <a:spcPct val="90000"/>
+              </a:lnSpc>
+              <a:spcBef>
+                <a:spcPts val="500"/>
+              </a:spcBef>
+              <a:buFont typeface="Arial" panose="020B0604020202020204" pitchFamily="34" charset="0"/>
+              <a:buChar char="•"/>
+              <a:defRPr sz="1800" kern="1200">
+                <a:solidFill>
+                  <a:schemeClr val="tx1"/>
+                </a:solidFill>
+                <a:latin typeface="+mn-lt"/>
+                <a:ea typeface="+mn-ea"/>
+                <a:cs typeface="+mn-cs"/>
+              </a:defRPr>
+            </a:lvl8pPr>
+            <a:lvl9pPr marL="3886200" indent="-228600" algn="l" defTabSz="914400" rtl="0" eaLnBrk="1" latinLnBrk="0" hangingPunct="1">
+              <a:lnSpc>
+                <a:spcPct val="90000"/>
+              </a:lnSpc>
+              <a:spcBef>
+                <a:spcPts val="500"/>
+              </a:spcBef>
+              <a:buFont typeface="Arial" panose="020B0604020202020204" pitchFamily="34" charset="0"/>
+              <a:buChar char="•"/>
+              <a:defRPr sz="1800" kern="1200">
+                <a:solidFill>
+                  <a:schemeClr val="tx1"/>
+                </a:solidFill>
+                <a:latin typeface="+mn-lt"/>
+                <a:ea typeface="+mn-ea"/>
+                <a:cs typeface="+mn-cs"/>
+              </a:defRPr>
+            </a:lvl9pPr>
+          </a:lstStyle>
+          <a:p>
+            <a:pPr marL="0" indent="0">
+              <a:buFont typeface="Arial" panose="020B0604020202020204" pitchFamily="34" charset="0"/>
+              <a:buNone/>
+            </a:pPr>
+            <a:r>
+              <a:rPr lang="en-GB" sz="1600" dirty="0"/>
+              <a:t>Without DI</a:t>
+            </a:r>
+          </a:p>
+        </p:txBody>
+      </p:sp>
+      <p:sp>
+        <p:nvSpPr>
+          <p:cNvPr id="8" name="Content Placeholder 2">
+            <a:extLst>
+              <a:ext uri="{FF2B5EF4-FFF2-40B4-BE49-F238E27FC236}">
+                <a16:creationId xmlns:a16="http://schemas.microsoft.com/office/drawing/2014/main" id="{DA6FF717-7359-3A09-1F10-006E07CD1AAA}"/>
+              </a:ext>
+            </a:extLst>
+          </p:cNvPr>
+          <p:cNvSpPr txBox="1">
+            <a:spLocks/>
+          </p:cNvSpPr>
+          <p:nvPr/>
+        </p:nvSpPr>
+        <p:spPr>
+          <a:xfrm>
+            <a:off x="9397090" y="4326274"/>
+            <a:ext cx="1736273" cy="427719"/>
+          </a:xfrm>
+          <a:prstGeom prst="rect">
+            <a:avLst/>
+          </a:prstGeom>
+        </p:spPr>
+        <p:txBody>
+          <a:bodyPr vert="horz" lIns="91440" tIns="45720" rIns="91440" bIns="45720" rtlCol="0">
+            <a:normAutofit/>
+          </a:bodyPr>
+          <a:lstStyle>
+            <a:lvl1pPr marL="228600" indent="-228600" algn="l" defTabSz="914400" rtl="0" eaLnBrk="1" latinLnBrk="0" hangingPunct="1">
+              <a:lnSpc>
+                <a:spcPct val="90000"/>
+              </a:lnSpc>
+              <a:spcBef>
+                <a:spcPts val="1000"/>
+              </a:spcBef>
+              <a:buFont typeface="Arial" panose="020B0604020202020204" pitchFamily="34" charset="0"/>
+              <a:buChar char="•"/>
+              <a:defRPr sz="2800" kern="1200">
+                <a:solidFill>
+                  <a:schemeClr val="tx1"/>
+                </a:solidFill>
+                <a:latin typeface="+mn-lt"/>
+                <a:ea typeface="+mn-ea"/>
+                <a:cs typeface="+mn-cs"/>
+              </a:defRPr>
+            </a:lvl1pPr>
+            <a:lvl2pPr marL="685800" indent="-228600" algn="l" defTabSz="914400" rtl="0" eaLnBrk="1" latinLnBrk="0" hangingPunct="1">
+              <a:lnSpc>
+                <a:spcPct val="90000"/>
+              </a:lnSpc>
+              <a:spcBef>
+                <a:spcPts val="500"/>
+              </a:spcBef>
+              <a:buFont typeface="Arial" panose="020B0604020202020204" pitchFamily="34" charset="0"/>
+              <a:buChar char="•"/>
+              <a:defRPr sz="2400" kern="1200">
+                <a:solidFill>
+                  <a:schemeClr val="tx1"/>
+                </a:solidFill>
+                <a:latin typeface="+mn-lt"/>
+                <a:ea typeface="+mn-ea"/>
+                <a:cs typeface="+mn-cs"/>
+              </a:defRPr>
+            </a:lvl2pPr>
+            <a:lvl3pPr marL="1143000" indent="-228600" algn="l" defTabSz="914400" rtl="0" eaLnBrk="1" latinLnBrk="0" hangingPunct="1">
+              <a:lnSpc>
+                <a:spcPct val="90000"/>
+              </a:lnSpc>
+              <a:spcBef>
+                <a:spcPts val="500"/>
+              </a:spcBef>
+              <a:buFont typeface="Arial" panose="020B0604020202020204" pitchFamily="34" charset="0"/>
+              <a:buChar char="•"/>
+              <a:defRPr sz="2000" kern="1200">
+                <a:solidFill>
+                  <a:schemeClr val="tx1"/>
+                </a:solidFill>
+                <a:latin typeface="+mn-lt"/>
+                <a:ea typeface="+mn-ea"/>
+                <a:cs typeface="+mn-cs"/>
+              </a:defRPr>
+            </a:lvl3pPr>
+            <a:lvl4pPr marL="1600200" indent="-228600" algn="l" defTabSz="914400" rtl="0" eaLnBrk="1" latinLnBrk="0" hangingPunct="1">
+              <a:lnSpc>
+                <a:spcPct val="90000"/>
+              </a:lnSpc>
+              <a:spcBef>
+                <a:spcPts val="500"/>
+              </a:spcBef>
+              <a:buFont typeface="Arial" panose="020B0604020202020204" pitchFamily="34" charset="0"/>
+              <a:buChar char="•"/>
+              <a:defRPr sz="1800" kern="1200">
+                <a:solidFill>
+                  <a:schemeClr val="tx1"/>
+                </a:solidFill>
+                <a:latin typeface="+mn-lt"/>
+                <a:ea typeface="+mn-ea"/>
+                <a:cs typeface="+mn-cs"/>
+              </a:defRPr>
+            </a:lvl4pPr>
+            <a:lvl5pPr marL="2057400" indent="-228600" algn="l" defTabSz="914400" rtl="0" eaLnBrk="1" latinLnBrk="0" hangingPunct="1">
+              <a:lnSpc>
+                <a:spcPct val="90000"/>
+              </a:lnSpc>
+              <a:spcBef>
+                <a:spcPts val="500"/>
+              </a:spcBef>
+              <a:buFont typeface="Arial" panose="020B0604020202020204" pitchFamily="34" charset="0"/>
+              <a:buChar char="•"/>
+              <a:defRPr sz="1800" kern="1200">
+                <a:solidFill>
+                  <a:schemeClr val="tx1"/>
+                </a:solidFill>
+                <a:latin typeface="+mn-lt"/>
+                <a:ea typeface="+mn-ea"/>
+                <a:cs typeface="+mn-cs"/>
+              </a:defRPr>
+            </a:lvl5pPr>
+            <a:lvl6pPr marL="2514600" indent="-228600" algn="l" defTabSz="914400" rtl="0" eaLnBrk="1" latinLnBrk="0" hangingPunct="1">
+              <a:lnSpc>
+                <a:spcPct val="90000"/>
+              </a:lnSpc>
+              <a:spcBef>
+                <a:spcPts val="500"/>
+              </a:spcBef>
+              <a:buFont typeface="Arial" panose="020B0604020202020204" pitchFamily="34" charset="0"/>
+              <a:buChar char="•"/>
+              <a:defRPr sz="1800" kern="1200">
+                <a:solidFill>
+                  <a:schemeClr val="tx1"/>
+                </a:solidFill>
+                <a:latin typeface="+mn-lt"/>
+                <a:ea typeface="+mn-ea"/>
+                <a:cs typeface="+mn-cs"/>
+              </a:defRPr>
+            </a:lvl6pPr>
+            <a:lvl7pPr marL="2971800" indent="-228600" algn="l" defTabSz="914400" rtl="0" eaLnBrk="1" latinLnBrk="0" hangingPunct="1">
+              <a:lnSpc>
+                <a:spcPct val="90000"/>
+              </a:lnSpc>
+              <a:spcBef>
+                <a:spcPts val="500"/>
+              </a:spcBef>
+              <a:buFont typeface="Arial" panose="020B0604020202020204" pitchFamily="34" charset="0"/>
+              <a:buChar char="•"/>
+              <a:defRPr sz="1800" kern="1200">
+                <a:solidFill>
+                  <a:schemeClr val="tx1"/>
+                </a:solidFill>
+                <a:latin typeface="+mn-lt"/>
+                <a:ea typeface="+mn-ea"/>
+                <a:cs typeface="+mn-cs"/>
+              </a:defRPr>
+            </a:lvl7pPr>
+            <a:lvl8pPr marL="3429000" indent="-228600" algn="l" defTabSz="914400" rtl="0" eaLnBrk="1" latinLnBrk="0" hangingPunct="1">
+              <a:lnSpc>
+                <a:spcPct val="90000"/>
+              </a:lnSpc>
+              <a:spcBef>
+                <a:spcPts val="500"/>
+              </a:spcBef>
+              <a:buFont typeface="Arial" panose="020B0604020202020204" pitchFamily="34" charset="0"/>
+              <a:buChar char="•"/>
+              <a:defRPr sz="1800" kern="1200">
+                <a:solidFill>
+                  <a:schemeClr val="tx1"/>
+                </a:solidFill>
+                <a:latin typeface="+mn-lt"/>
+                <a:ea typeface="+mn-ea"/>
+                <a:cs typeface="+mn-cs"/>
+              </a:defRPr>
+            </a:lvl8pPr>
+            <a:lvl9pPr marL="3886200" indent="-228600" algn="l" defTabSz="914400" rtl="0" eaLnBrk="1" latinLnBrk="0" hangingPunct="1">
+              <a:lnSpc>
+                <a:spcPct val="90000"/>
+              </a:lnSpc>
+              <a:spcBef>
+                <a:spcPts val="500"/>
+              </a:spcBef>
+              <a:buFont typeface="Arial" panose="020B0604020202020204" pitchFamily="34" charset="0"/>
+              <a:buChar char="•"/>
+              <a:defRPr sz="1800" kern="1200">
+                <a:solidFill>
+                  <a:schemeClr val="tx1"/>
+                </a:solidFill>
+                <a:latin typeface="+mn-lt"/>
+                <a:ea typeface="+mn-ea"/>
+                <a:cs typeface="+mn-cs"/>
+              </a:defRPr>
+            </a:lvl9pPr>
+          </a:lstStyle>
+          <a:p>
+            <a:pPr marL="0" indent="0">
+              <a:buFont typeface="Arial" panose="020B0604020202020204" pitchFamily="34" charset="0"/>
+              <a:buNone/>
+            </a:pPr>
+            <a:r>
+              <a:rPr lang="en-GB" sz="1600" dirty="0"/>
+              <a:t>With DI</a:t>
+            </a:r>
+          </a:p>
+        </p:txBody>
+      </p:sp>
+    </p:spTree>
+    <p:extLst>
+      <p:ext uri="{BB962C8B-B14F-4D97-AF65-F5344CB8AC3E}">
+        <p14:creationId xmlns:p14="http://schemas.microsoft.com/office/powerpoint/2010/main" val="2931649090"/>
+      </p:ext>
+    </p:extLst>
+  </p:cSld>
+  <p:clrMapOvr>
+    <a:masterClrMapping/>
+  </p:clrMapOvr>
+</p:sld>
+</file>
+
+<file path=ppt/slides/slide7.xml><?xml version="1.0" encoding="utf-8"?>
+<p:sld xmlns:a="http://schemas.openxmlformats.org/drawingml/2006/main" xmlns:r="http://schemas.openxmlformats.org/officeDocument/2006/relationships" xmlns:p="http://schemas.openxmlformats.org/presentationml/2006/main">
+  <p:cSld>
+    <p:spTree>
+      <p:nvGrpSpPr>
+        <p:cNvPr id="1" name=""/>
+        <p:cNvGrpSpPr/>
+        <p:nvPr/>
+      </p:nvGrpSpPr>
+      <p:grpSpPr>
+        <a:xfrm>
+          <a:off x="0" y="0"/>
+          <a:ext cx="0" cy="0"/>
+          <a:chOff x="0" y="0"/>
+          <a:chExt cx="0" cy="0"/>
+        </a:xfrm>
+      </p:grpSpPr>
+      <p:sp>
+        <p:nvSpPr>
+          <p:cNvPr id="2" name="Title 1">
+            <a:extLst>
+              <a:ext uri="{FF2B5EF4-FFF2-40B4-BE49-F238E27FC236}">
                 <a16:creationId xmlns:a16="http://schemas.microsoft.com/office/drawing/2014/main" id="{69F81A73-D951-11F1-443D-3BAEC0683927}"/>
               </a:ext>
             </a:extLst>
@@ -5178,7 +6760,7 @@
               <a:buNone/>
             </a:pPr>
             <a:r>
-              <a:rPr lang="en-GB" sz="2000" dirty="0">
+              <a:rPr lang="en-GB" sz="1800" dirty="0">
                 <a:solidFill>
                   <a:srgbClr val="6C10B9"/>
                 </a:solidFill>
@@ -5186,11 +6768,11 @@
               <a:t>Spring</a:t>
             </a:r>
             <a:r>
-              <a:rPr lang="en-GB" sz="2000" dirty="0"/>
+              <a:rPr lang="en-GB" sz="1800" dirty="0"/>
               <a:t> container is at the core of the </a:t>
             </a:r>
             <a:r>
-              <a:rPr lang="en-GB" sz="2000" dirty="0">
+              <a:rPr lang="en-GB" sz="1800" dirty="0">
                 <a:solidFill>
                   <a:srgbClr val="6C10B9"/>
                 </a:solidFill>
@@ -5198,31 +6780,31 @@
               <a:t>Spring Framework</a:t>
             </a:r>
             <a:r>
-              <a:rPr lang="en-GB" sz="2000" dirty="0"/>
+              <a:rPr lang="en-GB" sz="1800" dirty="0"/>
               <a:t>. The container will: </a:t>
             </a:r>
           </a:p>
           <a:p>
             <a:r>
-              <a:rPr lang="en-GB" sz="2000" dirty="0"/>
+              <a:rPr lang="en-GB" sz="1800" dirty="0"/>
               <a:t>create the objects,</a:t>
             </a:r>
           </a:p>
           <a:p>
             <a:r>
-              <a:rPr lang="en-GB" sz="2000" dirty="0"/>
+              <a:rPr lang="en-GB" sz="1800" dirty="0"/>
               <a:t>wire them together,</a:t>
             </a:r>
           </a:p>
           <a:p>
             <a:r>
-              <a:rPr lang="en-GB" sz="2000" dirty="0"/>
+              <a:rPr lang="en-GB" sz="1800" dirty="0"/>
               <a:t>configure them, </a:t>
             </a:r>
           </a:p>
           <a:p>
             <a:r>
-              <a:rPr lang="en-GB" sz="2000" dirty="0"/>
+              <a:rPr lang="en-GB" sz="1800" dirty="0"/>
               <a:t>manage their complete life cycle from creation till destruction. </a:t>
             </a:r>
           </a:p>
@@ -5231,10 +6813,10 @@
               <a:buNone/>
             </a:pPr>
             <a:r>
-              <a:rPr lang="en-GB" sz="2000" dirty="0"/>
-              <a:t>The Spring container uses DI to manage the components that make up an application. These objects are called Spring Beans, which we will discuss in the next chapter.</a:t>
-            </a:r>
-            <a:endParaRPr lang="en-PL" sz="2000" dirty="0"/>
+              <a:rPr lang="en-GB" sz="1800" dirty="0"/>
+              <a:t>The Spring container uses DI to manage the components that make up an application. These objects are called Spring Beans.</a:t>
+            </a:r>
+            <a:endParaRPr lang="en-PL" sz="1800" dirty="0"/>
           </a:p>
         </p:txBody>
       </p:sp>
@@ -5251,7 +6833,7 @@
 </p:sld>
 </file>
 
-<file path=ppt/slides/slide7.xml><?xml version="1.0" encoding="utf-8"?>
+<file path=ppt/slides/slide8.xml><?xml version="1.0" encoding="utf-8"?>
 <p:sld xmlns:a="http://schemas.openxmlformats.org/drawingml/2006/main" xmlns:r="http://schemas.openxmlformats.org/officeDocument/2006/relationships" xmlns:p="http://schemas.openxmlformats.org/presentationml/2006/main">
   <p:cSld>
     <p:spTree>
@@ -5876,238 +7458,6 @@
 </p:sld>
 </file>
 
-<file path=ppt/slides/slide8.xml><?xml version="1.0" encoding="utf-8"?>
-<p:sld xmlns:a="http://schemas.openxmlformats.org/drawingml/2006/main" xmlns:r="http://schemas.openxmlformats.org/officeDocument/2006/relationships" xmlns:p="http://schemas.openxmlformats.org/presentationml/2006/main">
-  <p:cSld>
-    <p:spTree>
-      <p:nvGrpSpPr>
-        <p:cNvPr id="1" name=""/>
-        <p:cNvGrpSpPr/>
-        <p:nvPr/>
-      </p:nvGrpSpPr>
-      <p:grpSpPr>
-        <a:xfrm>
-          <a:off x="0" y="0"/>
-          <a:ext cx="0" cy="0"/>
-          <a:chOff x="0" y="0"/>
-          <a:chExt cx="0" cy="0"/>
-        </a:xfrm>
-      </p:grpSpPr>
-      <p:sp>
-        <p:nvSpPr>
-          <p:cNvPr id="2" name="Title 1">
-            <a:extLst>
-              <a:ext uri="{FF2B5EF4-FFF2-40B4-BE49-F238E27FC236}">
-                <a16:creationId xmlns:a16="http://schemas.microsoft.com/office/drawing/2014/main" id="{A31589A7-47D9-1295-AC2B-60B49DB9ADB4}"/>
-              </a:ext>
-            </a:extLst>
-          </p:cNvPr>
-          <p:cNvSpPr>
-            <a:spLocks noGrp="1"/>
-          </p:cNvSpPr>
-          <p:nvPr>
-            <p:ph type="title"/>
-          </p:nvPr>
-        </p:nvSpPr>
-        <p:spPr/>
-        <p:txBody>
-          <a:bodyPr/>
-          <a:lstStyle/>
-          <a:p>
-            <a:r>
-              <a:rPr lang="en-PL" dirty="0">
-                <a:solidFill>
-                  <a:srgbClr val="6C10B9"/>
-                </a:solidFill>
-                <a:latin typeface="Poppins" pitchFamily="2" charset="77"/>
-                <a:cs typeface="Poppins" pitchFamily="2" charset="77"/>
-              </a:rPr>
-              <a:t>Spring Boot Annotations</a:t>
-            </a:r>
-          </a:p>
-        </p:txBody>
-      </p:sp>
-      <p:pic>
-        <p:nvPicPr>
-          <p:cNvPr id="5" name="Picture 4">
-            <a:extLst>
-              <a:ext uri="{FF2B5EF4-FFF2-40B4-BE49-F238E27FC236}">
-                <a16:creationId xmlns:a16="http://schemas.microsoft.com/office/drawing/2014/main" id="{8503C532-6B95-908B-0186-1FEC66568123}"/>
-              </a:ext>
-            </a:extLst>
-          </p:cNvPr>
-          <p:cNvPicPr>
-            <a:picLocks noChangeAspect="1"/>
-          </p:cNvPicPr>
-          <p:nvPr/>
-        </p:nvPicPr>
-        <p:blipFill rotWithShape="1">
-          <a:blip r:embed="rId2"/>
-          <a:srcRect t="10159" b="9048"/>
-          <a:stretch/>
-        </p:blipFill>
-        <p:spPr>
-          <a:xfrm>
-            <a:off x="1754571" y="1426029"/>
-            <a:ext cx="8732534" cy="4985657"/>
-          </a:xfrm>
-          <a:prstGeom prst="rect">
-            <a:avLst/>
-          </a:prstGeom>
-        </p:spPr>
-      </p:pic>
-      <p:sp>
-        <p:nvSpPr>
-          <p:cNvPr id="6" name="TextBox 5">
-            <a:extLst>
-              <a:ext uri="{FF2B5EF4-FFF2-40B4-BE49-F238E27FC236}">
-                <a16:creationId xmlns:a16="http://schemas.microsoft.com/office/drawing/2014/main" id="{C6234D09-0EB8-FEB3-4397-8868F58F4F6E}"/>
-              </a:ext>
-            </a:extLst>
-          </p:cNvPr>
-          <p:cNvSpPr txBox="1"/>
-          <p:nvPr/>
-        </p:nvSpPr>
-        <p:spPr>
-          <a:xfrm>
-            <a:off x="5193324" y="6469793"/>
-            <a:ext cx="5257800" cy="246221"/>
-          </a:xfrm>
-          <a:prstGeom prst="rect">
-            <a:avLst/>
-          </a:prstGeom>
-          <a:noFill/>
-        </p:spPr>
-        <p:txBody>
-          <a:bodyPr wrap="square" rtlCol="0">
-            <a:spAutoFit/>
-          </a:bodyPr>
-          <a:lstStyle/>
-          <a:p>
-            <a:pPr algn="ctr"/>
-            <a:r>
-              <a:rPr lang="en-PL" sz="1000" dirty="0">
-                <a:solidFill>
-                  <a:schemeClr val="tx1">
-                    <a:lumMod val="50000"/>
-                    <a:lumOff val="50000"/>
-                  </a:schemeClr>
-                </a:solidFill>
-              </a:rPr>
-              <a:t>Source: </a:t>
-            </a:r>
-            <a:r>
-              <a:rPr lang="en-GB" sz="1000" dirty="0">
-                <a:solidFill>
-                  <a:schemeClr val="tx1">
-                    <a:lumMod val="50000"/>
-                    <a:lumOff val="50000"/>
-                  </a:schemeClr>
-                </a:solidFill>
-              </a:rPr>
-              <a:t>https://</a:t>
-            </a:r>
-            <a:r>
-              <a:rPr lang="en-GB" sz="1000" dirty="0" err="1">
-                <a:solidFill>
-                  <a:schemeClr val="tx1">
-                    <a:lumMod val="50000"/>
-                    <a:lumOff val="50000"/>
-                  </a:schemeClr>
-                </a:solidFill>
-              </a:rPr>
-              <a:t>www.jrebel.com</a:t>
-            </a:r>
-            <a:r>
-              <a:rPr lang="en-GB" sz="1000" dirty="0">
-                <a:solidFill>
-                  <a:schemeClr val="tx1">
-                    <a:lumMod val="50000"/>
-                    <a:lumOff val="50000"/>
-                  </a:schemeClr>
-                </a:solidFill>
-              </a:rPr>
-              <a:t>/sites/rebel/files/pdfs/</a:t>
-            </a:r>
-            <a:r>
-              <a:rPr lang="en-GB" sz="1000" dirty="0" err="1">
-                <a:solidFill>
-                  <a:schemeClr val="tx1">
-                    <a:lumMod val="50000"/>
-                    <a:lumOff val="50000"/>
-                  </a:schemeClr>
-                </a:solidFill>
-              </a:rPr>
-              <a:t>cheatsheet</a:t>
-            </a:r>
-            <a:r>
-              <a:rPr lang="en-GB" sz="1000" dirty="0">
-                <a:solidFill>
-                  <a:schemeClr val="tx1">
-                    <a:lumMod val="50000"/>
-                    <a:lumOff val="50000"/>
-                  </a:schemeClr>
-                </a:solidFill>
-              </a:rPr>
-              <a:t>-</a:t>
-            </a:r>
-            <a:r>
-              <a:rPr lang="en-GB" sz="1000" dirty="0" err="1">
-                <a:solidFill>
-                  <a:schemeClr val="tx1">
-                    <a:lumMod val="50000"/>
-                    <a:lumOff val="50000"/>
-                  </a:schemeClr>
-                </a:solidFill>
-              </a:rPr>
-              <a:t>jrebel</a:t>
-            </a:r>
-            <a:r>
-              <a:rPr lang="en-GB" sz="1000" dirty="0">
-                <a:solidFill>
-                  <a:schemeClr val="tx1">
-                    <a:lumMod val="50000"/>
-                    <a:lumOff val="50000"/>
-                  </a:schemeClr>
-                </a:solidFill>
-              </a:rPr>
-              <a:t>-spring-</a:t>
-            </a:r>
-            <a:r>
-              <a:rPr lang="en-GB" sz="1000" dirty="0" err="1">
-                <a:solidFill>
-                  <a:schemeClr val="tx1">
-                    <a:lumMod val="50000"/>
-                    <a:lumOff val="50000"/>
-                  </a:schemeClr>
-                </a:solidFill>
-              </a:rPr>
-              <a:t>annotations.pdf</a:t>
-            </a:r>
-            <a:endParaRPr lang="en-PL" sz="1000" dirty="0">
-              <a:solidFill>
-                <a:schemeClr val="tx1">
-                  <a:lumMod val="50000"/>
-                  <a:lumOff val="50000"/>
-                </a:schemeClr>
-              </a:solidFill>
-            </a:endParaRPr>
-          </a:p>
-        </p:txBody>
-      </p:sp>
-    </p:spTree>
-    <p:extLst>
-      <p:ext uri="{BB962C8B-B14F-4D97-AF65-F5344CB8AC3E}">
-        <p14:creationId xmlns:p14="http://schemas.microsoft.com/office/powerpoint/2010/main" val="1769765295"/>
-      </p:ext>
-    </p:extLst>
-  </p:cSld>
-  <p:clrMapOvr>
-    <a:masterClrMapping/>
-  </p:clrMapOvr>
-</p:sld>
-</file>
-
 <file path=ppt/slides/slide9.xml><?xml version="1.0" encoding="utf-8"?>
 <p:sld xmlns:a="http://schemas.openxmlformats.org/drawingml/2006/main" xmlns:r="http://schemas.openxmlformats.org/officeDocument/2006/relationships" xmlns:p="http://schemas.openxmlformats.org/presentationml/2006/main">
   <p:cSld>
@@ -6130,7 +7480,7 @@
           <p:cNvPr id="2" name="Title 1">
             <a:extLst>
               <a:ext uri="{FF2B5EF4-FFF2-40B4-BE49-F238E27FC236}">
-                <a16:creationId xmlns:a16="http://schemas.microsoft.com/office/drawing/2014/main" id="{FEFF485B-AFBB-2D4D-8F98-7BD0600D716C}"/>
+                <a16:creationId xmlns:a16="http://schemas.microsoft.com/office/drawing/2014/main" id="{A31589A7-47D9-1295-AC2B-60B49DB9ADB4}"/>
               </a:ext>
             </a:extLst>
           </p:cNvPr>
@@ -6147,113 +7497,190 @@
           <a:lstStyle/>
           <a:p>
             <a:r>
-              <a:rPr lang="en-PL" dirty="0"/>
-              <a:t>Bootstrapping Spring Boot App</a:t>
-            </a:r>
-          </a:p>
-        </p:txBody>
-      </p:sp>
-      <p:sp>
-        <p:nvSpPr>
-          <p:cNvPr id="3" name="Content Placeholder 2">
-            <a:extLst>
-              <a:ext uri="{FF2B5EF4-FFF2-40B4-BE49-F238E27FC236}">
-                <a16:creationId xmlns:a16="http://schemas.microsoft.com/office/drawing/2014/main" id="{EC82DF05-400E-8BE2-7C9A-1EF696CAA20F}"/>
-              </a:ext>
-            </a:extLst>
-          </p:cNvPr>
-          <p:cNvSpPr>
-            <a:spLocks noGrp="1"/>
-          </p:cNvSpPr>
-          <p:nvPr>
-            <p:ph idx="1"/>
-          </p:nvPr>
-        </p:nvSpPr>
+              <a:rPr lang="en-PL" dirty="0">
+                <a:solidFill>
+                  <a:srgbClr val="6C10B9"/>
+                </a:solidFill>
+                <a:latin typeface="Poppins" pitchFamily="2" charset="77"/>
+                <a:cs typeface="Poppins" pitchFamily="2" charset="77"/>
+              </a:rPr>
+              <a:t>Spring Boot Annotations</a:t>
+            </a:r>
+          </a:p>
+        </p:txBody>
+      </p:sp>
+      <p:pic>
+        <p:nvPicPr>
+          <p:cNvPr id="5" name="Picture 4">
+            <a:extLst>
+              <a:ext uri="{FF2B5EF4-FFF2-40B4-BE49-F238E27FC236}">
+                <a16:creationId xmlns:a16="http://schemas.microsoft.com/office/drawing/2014/main" id="{8503C532-6B95-908B-0186-1FEC66568123}"/>
+              </a:ext>
+            </a:extLst>
+          </p:cNvPr>
+          <p:cNvPicPr>
+            <a:picLocks noChangeAspect="1"/>
+          </p:cNvPicPr>
+          <p:nvPr/>
+        </p:nvPicPr>
+        <p:blipFill rotWithShape="1">
+          <a:blip r:embed="rId2"/>
+          <a:srcRect t="10159" b="9048"/>
+          <a:stretch/>
+        </p:blipFill>
         <p:spPr>
           <a:xfrm>
-            <a:off x="838200" y="1825625"/>
-            <a:ext cx="10515600" cy="2583089"/>
+            <a:off x="2031466" y="1770566"/>
+            <a:ext cx="8129067" cy="4641120"/>
           </a:xfrm>
+          <a:prstGeom prst="rect">
+            <a:avLst/>
+          </a:prstGeom>
         </p:spPr>
-        <p:txBody>
-          <a:bodyPr>
-            <a:normAutofit/>
+      </p:pic>
+      <p:sp>
+        <p:nvSpPr>
+          <p:cNvPr id="6" name="TextBox 5">
+            <a:extLst>
+              <a:ext uri="{FF2B5EF4-FFF2-40B4-BE49-F238E27FC236}">
+                <a16:creationId xmlns:a16="http://schemas.microsoft.com/office/drawing/2014/main" id="{C6234D09-0EB8-FEB3-4397-8868F58F4F6E}"/>
+              </a:ext>
+            </a:extLst>
+          </p:cNvPr>
+          <p:cNvSpPr txBox="1"/>
+          <p:nvPr/>
+        </p:nvSpPr>
+        <p:spPr>
+          <a:xfrm>
+            <a:off x="5193324" y="6469793"/>
+            <a:ext cx="5257800" cy="246221"/>
+          </a:xfrm>
+          <a:prstGeom prst="rect">
+            <a:avLst/>
+          </a:prstGeom>
+          <a:noFill/>
+        </p:spPr>
+        <p:txBody>
+          <a:bodyPr wrap="square" rtlCol="0">
+            <a:spAutoFit/>
           </a:bodyPr>
           <a:lstStyle/>
           <a:p>
-            <a:pPr marL="0" indent="0">
-              <a:buNone/>
-            </a:pPr>
-            <a:r>
-              <a:rPr lang="en-GB" sz="2400" dirty="0"/>
-              <a:t>Spring Boot </a:t>
-            </a:r>
-            <a:r>
-              <a:rPr lang="en-GB" sz="2400" dirty="0" err="1"/>
-              <a:t>Initializr</a:t>
-            </a:r>
-            <a:endParaRPr lang="en-GB" sz="2400" dirty="0"/>
-          </a:p>
-          <a:p>
-            <a:pPr lvl="1"/>
-            <a:r>
-              <a:rPr lang="en-GB" sz="2000" dirty="0"/>
-              <a:t>https://start.spring.io</a:t>
-            </a:r>
-          </a:p>
-          <a:p>
-            <a:pPr lvl="1"/>
-            <a:endParaRPr lang="en-GB" sz="2000" dirty="0"/>
-          </a:p>
-          <a:p>
-            <a:pPr marL="0" indent="0">
-              <a:buNone/>
-            </a:pPr>
-            <a:r>
-              <a:rPr lang="en-GB" sz="2400" dirty="0"/>
-              <a:t>Spring Boot Starters list</a:t>
-            </a:r>
-          </a:p>
-          <a:p>
-            <a:pPr lvl="1"/>
-            <a:r>
-              <a:rPr lang="en-GB" sz="2000" dirty="0"/>
+            <a:pPr algn="ctr"/>
+            <a:r>
+              <a:rPr lang="en-PL" sz="1000" dirty="0">
+                <a:solidFill>
+                  <a:schemeClr val="tx1">
+                    <a:lumMod val="50000"/>
+                    <a:lumOff val="50000"/>
+                  </a:schemeClr>
+                </a:solidFill>
+              </a:rPr>
+              <a:t>Source: </a:t>
+            </a:r>
+            <a:r>
+              <a:rPr lang="en-GB" sz="1000" dirty="0">
+                <a:solidFill>
+                  <a:schemeClr val="tx1">
+                    <a:lumMod val="50000"/>
+                    <a:lumOff val="50000"/>
+                  </a:schemeClr>
+                </a:solidFill>
+              </a:rPr>
               <a:t>https://</a:t>
             </a:r>
             <a:r>
-              <a:rPr lang="en-GB" sz="2000" dirty="0" err="1"/>
-              <a:t>docs.spring.io</a:t>
-            </a:r>
-            <a:r>
-              <a:rPr lang="en-GB" sz="2000" dirty="0"/>
-              <a:t>/spring-boot/docs/current/reference/</a:t>
-            </a:r>
-            <a:r>
-              <a:rPr lang="en-GB" sz="2000" dirty="0" err="1"/>
-              <a:t>htmlsingle</a:t>
-            </a:r>
-            <a:r>
-              <a:rPr lang="en-GB" sz="2000" dirty="0"/>
-              <a:t>/#</a:t>
-            </a:r>
-            <a:r>
-              <a:rPr lang="en-GB" sz="2000" dirty="0" err="1"/>
-              <a:t>using.build-systems.starters</a:t>
-            </a:r>
-            <a:endParaRPr lang="en-GB" sz="2000" dirty="0"/>
-          </a:p>
-          <a:p>
-            <a:pPr marL="0" indent="0">
-              <a:buNone/>
-            </a:pPr>
-            <a:endParaRPr lang="en-GB" dirty="0"/>
+              <a:rPr lang="en-GB" sz="1000" dirty="0" err="1">
+                <a:solidFill>
+                  <a:schemeClr val="tx1">
+                    <a:lumMod val="50000"/>
+                    <a:lumOff val="50000"/>
+                  </a:schemeClr>
+                </a:solidFill>
+              </a:rPr>
+              <a:t>www.jrebel.com</a:t>
+            </a:r>
+            <a:r>
+              <a:rPr lang="en-GB" sz="1000" dirty="0">
+                <a:solidFill>
+                  <a:schemeClr val="tx1">
+                    <a:lumMod val="50000"/>
+                    <a:lumOff val="50000"/>
+                  </a:schemeClr>
+                </a:solidFill>
+              </a:rPr>
+              <a:t>/sites/rebel/files/pdfs/</a:t>
+            </a:r>
+            <a:r>
+              <a:rPr lang="en-GB" sz="1000" dirty="0" err="1">
+                <a:solidFill>
+                  <a:schemeClr val="tx1">
+                    <a:lumMod val="50000"/>
+                    <a:lumOff val="50000"/>
+                  </a:schemeClr>
+                </a:solidFill>
+              </a:rPr>
+              <a:t>cheatsheet</a:t>
+            </a:r>
+            <a:r>
+              <a:rPr lang="en-GB" sz="1000" dirty="0">
+                <a:solidFill>
+                  <a:schemeClr val="tx1">
+                    <a:lumMod val="50000"/>
+                    <a:lumOff val="50000"/>
+                  </a:schemeClr>
+                </a:solidFill>
+              </a:rPr>
+              <a:t>-</a:t>
+            </a:r>
+            <a:r>
+              <a:rPr lang="en-GB" sz="1000" dirty="0" err="1">
+                <a:solidFill>
+                  <a:schemeClr val="tx1">
+                    <a:lumMod val="50000"/>
+                    <a:lumOff val="50000"/>
+                  </a:schemeClr>
+                </a:solidFill>
+              </a:rPr>
+              <a:t>jrebel</a:t>
+            </a:r>
+            <a:r>
+              <a:rPr lang="en-GB" sz="1000" dirty="0">
+                <a:solidFill>
+                  <a:schemeClr val="tx1">
+                    <a:lumMod val="50000"/>
+                    <a:lumOff val="50000"/>
+                  </a:schemeClr>
+                </a:solidFill>
+              </a:rPr>
+              <a:t>-spring-</a:t>
+            </a:r>
+            <a:r>
+              <a:rPr lang="en-GB" sz="1000" dirty="0" err="1">
+                <a:solidFill>
+                  <a:schemeClr val="tx1">
+                    <a:lumMod val="50000"/>
+                    <a:lumOff val="50000"/>
+                  </a:schemeClr>
+                </a:solidFill>
+              </a:rPr>
+              <a:t>annotations.pdf</a:t>
+            </a:r>
+            <a:endParaRPr lang="en-PL" sz="1000" dirty="0">
+              <a:solidFill>
+                <a:schemeClr val="tx1">
+                  <a:lumMod val="50000"/>
+                  <a:lumOff val="50000"/>
+                </a:schemeClr>
+              </a:solidFill>
+            </a:endParaRPr>
           </a:p>
         </p:txBody>
       </p:sp>
     </p:spTree>
     <p:extLst>
       <p:ext uri="{BB962C8B-B14F-4D97-AF65-F5344CB8AC3E}">
-        <p14:creationId xmlns:p14="http://schemas.microsoft.com/office/powerpoint/2010/main" val="3097249339"/>
+        <p14:creationId xmlns:p14="http://schemas.microsoft.com/office/powerpoint/2010/main" val="1769765295"/>
       </p:ext>
     </p:extLst>
   </p:cSld>

</xml_diff>